<commit_message>
Add black logo to poster
</commit_message>
<xml_diff>
--- a/poster/adass2018-gammapy-poster.pptx
+++ b/poster/adass2018-gammapy-poster.pptx
@@ -1,14 +1,14 @@
 
 <file path=ppt/presentation.xml><?xml version="1.0" encoding="utf-8"?>
-<p:presentation xmlns:a="http://schemas.openxmlformats.org/drawingml/2006/main" xmlns:r="http://schemas.openxmlformats.org/officeDocument/2006/relationships" xmlns:p="http://schemas.openxmlformats.org/presentationml/2006/main">
+<p:presentation xmlns:a="http://schemas.openxmlformats.org/drawingml/2006/main" xmlns:r="http://schemas.openxmlformats.org/officeDocument/2006/relationships" xmlns:p="http://schemas.openxmlformats.org/presentationml/2006/main" xmlns:m="http://schemas.openxmlformats.org/officeDocument/2006/math" xmlns:a14="http://schemas.microsoft.com/office/drawing/2010/main">
   <p:sldMasterIdLst>
-    <p:sldMasterId id="2147483648" r:id="rId1"/>
+    <p:sldMasterId id="2147483648" r:id="rId5"/>
   </p:sldMasterIdLst>
   <p:notesMasterIdLst>
-    <p:notesMasterId r:id="rId3"/>
+    <p:notesMasterId r:id="rId7"/>
   </p:notesMasterIdLst>
   <p:sldIdLst>
-    <p:sldId id="256" r:id="rId2"/>
+    <p:sldId id="256" r:id="rId8"/>
   </p:sldIdLst>
   <p:sldSz cx="35915600" cy="50800000"/>
   <p:notesSz cx="6858000" cy="9144000"/>
@@ -28,7 +28,7 @@
       <a:buFontTx/>
       <a:buNone/>
       <a:tabLst/>
-      <a:defRPr kumimoji="0" sz="1800" b="0" i="0" u="none" strike="noStrike" cap="none" spc="0" normalizeH="0" baseline="0">
+      <a:defRPr b="0" baseline="0" cap="none" i="0" spc="0" strike="noStrike" sz="1800" u="none" kumimoji="0" normalizeH="0">
         <a:ln>
           <a:noFill/>
         </a:ln>
@@ -54,7 +54,7 @@
       <a:buFontTx/>
       <a:buNone/>
       <a:tabLst/>
-      <a:defRPr kumimoji="0" sz="1200" b="0" i="0" u="none" strike="noStrike" cap="none" spc="0" normalizeH="0" baseline="0">
+      <a:defRPr b="0" baseline="0" cap="none" i="0" spc="0" strike="noStrike" sz="1200" u="none" kumimoji="0" normalizeH="0">
         <a:ln>
           <a:noFill/>
         </a:ln>
@@ -84,7 +84,7 @@
       <a:buFontTx/>
       <a:buNone/>
       <a:tabLst/>
-      <a:defRPr kumimoji="0" sz="1200" b="0" i="0" u="none" strike="noStrike" cap="none" spc="0" normalizeH="0" baseline="0">
+      <a:defRPr b="0" baseline="0" cap="none" i="0" spc="0" strike="noStrike" sz="1200" u="none" kumimoji="0" normalizeH="0">
         <a:ln>
           <a:noFill/>
         </a:ln>
@@ -114,7 +114,7 @@
       <a:buFontTx/>
       <a:buNone/>
       <a:tabLst/>
-      <a:defRPr kumimoji="0" sz="1200" b="0" i="0" u="none" strike="noStrike" cap="none" spc="0" normalizeH="0" baseline="0">
+      <a:defRPr b="0" baseline="0" cap="none" i="0" spc="0" strike="noStrike" sz="1200" u="none" kumimoji="0" normalizeH="0">
         <a:ln>
           <a:noFill/>
         </a:ln>
@@ -144,7 +144,7 @@
       <a:buFontTx/>
       <a:buNone/>
       <a:tabLst/>
-      <a:defRPr kumimoji="0" sz="1200" b="0" i="0" u="none" strike="noStrike" cap="none" spc="0" normalizeH="0" baseline="0">
+      <a:defRPr b="0" baseline="0" cap="none" i="0" spc="0" strike="noStrike" sz="1200" u="none" kumimoji="0" normalizeH="0">
         <a:ln>
           <a:noFill/>
         </a:ln>
@@ -174,7 +174,7 @@
       <a:buFontTx/>
       <a:buNone/>
       <a:tabLst/>
-      <a:defRPr kumimoji="0" sz="1200" b="0" i="0" u="none" strike="noStrike" cap="none" spc="0" normalizeH="0" baseline="0">
+      <a:defRPr b="0" baseline="0" cap="none" i="0" spc="0" strike="noStrike" sz="1200" u="none" kumimoji="0" normalizeH="0">
         <a:ln>
           <a:noFill/>
         </a:ln>
@@ -204,7 +204,7 @@
       <a:buFontTx/>
       <a:buNone/>
       <a:tabLst/>
-      <a:defRPr kumimoji="0" sz="1200" b="0" i="0" u="none" strike="noStrike" cap="none" spc="0" normalizeH="0" baseline="0">
+      <a:defRPr b="0" baseline="0" cap="none" i="0" spc="0" strike="noStrike" sz="1200" u="none" kumimoji="0" normalizeH="0">
         <a:ln>
           <a:noFill/>
         </a:ln>
@@ -234,7 +234,7 @@
       <a:buFontTx/>
       <a:buNone/>
       <a:tabLst/>
-      <a:defRPr kumimoji="0" sz="1200" b="0" i="0" u="none" strike="noStrike" cap="none" spc="0" normalizeH="0" baseline="0">
+      <a:defRPr b="0" baseline="0" cap="none" i="0" spc="0" strike="noStrike" sz="1200" u="none" kumimoji="0" normalizeH="0">
         <a:ln>
           <a:noFill/>
         </a:ln>
@@ -264,7 +264,7 @@
       <a:buFontTx/>
       <a:buNone/>
       <a:tabLst/>
-      <a:defRPr kumimoji="0" sz="1200" b="0" i="0" u="none" strike="noStrike" cap="none" spc="0" normalizeH="0" baseline="0">
+      <a:defRPr b="0" baseline="0" cap="none" i="0" spc="0" strike="noStrike" sz="1200" u="none" kumimoji="0" normalizeH="0">
         <a:ln>
           <a:noFill/>
         </a:ln>
@@ -294,7 +294,7 @@
       <a:buFontTx/>
       <a:buNone/>
       <a:tabLst/>
-      <a:defRPr kumimoji="0" sz="1200" b="0" i="0" u="none" strike="noStrike" cap="none" spc="0" normalizeH="0" baseline="0">
+      <a:defRPr b="0" baseline="0" cap="none" i="0" spc="0" strike="noStrike" sz="1200" u="none" kumimoji="0" normalizeH="0">
         <a:ln>
           <a:noFill/>
         </a:ln>
@@ -313,14 +313,13 @@
 </p:presentation>
 </file>
 
+<file path=ppt/commentAuthors.xml><?xml version="1.0" encoding="utf-8"?>
+<p:cmAuthorLst xmlns:a="http://schemas.openxmlformats.org/drawingml/2006/main" xmlns:r="http://schemas.openxmlformats.org/officeDocument/2006/relationships" xmlns:p="http://schemas.openxmlformats.org/presentationml/2006/main" xmlns:m="http://schemas.openxmlformats.org/officeDocument/2006/math" xmlns:a14="http://schemas.microsoft.com/office/drawing/2010/main"/>
+</file>
+
 <file path=ppt/notesMasters/notesMaster1.xml><?xml version="1.0" encoding="utf-8"?>
-<p:notesMaster xmlns:a="http://schemas.openxmlformats.org/drawingml/2006/main" xmlns:r="http://schemas.openxmlformats.org/officeDocument/2006/relationships" xmlns:p="http://schemas.openxmlformats.org/presentationml/2006/main">
+<p:notesMaster xmlns:a="http://schemas.openxmlformats.org/drawingml/2006/main" xmlns:r="http://schemas.openxmlformats.org/officeDocument/2006/relationships" xmlns:p="http://schemas.openxmlformats.org/presentationml/2006/main" xmlns:m="http://schemas.openxmlformats.org/officeDocument/2006/math" xmlns:a14="http://schemas.microsoft.com/office/drawing/2010/main">
   <p:cSld>
-    <p:bg>
-      <p:bgRef idx="1001">
-        <a:schemeClr val="bg1"/>
-      </p:bgRef>
-    </p:bg>
     <p:spTree>
       <p:nvGrpSpPr>
         <p:cNvPr id="1" name=""/>
@@ -338,9 +337,7 @@
       <p:sp>
         <p:nvSpPr>
           <p:cNvPr id="24" name="Shape 24"/>
-          <p:cNvSpPr>
-            <a:spLocks noGrp="1" noRot="1" noChangeAspect="1"/>
-          </p:cNvSpPr>
+          <p:cNvSpPr/>
           <p:nvPr>
             <p:ph type="sldImg"/>
           </p:nvPr>
@@ -358,16 +355,14 @@
           <a:bodyPr/>
           <a:lstStyle/>
           <a:p>
-            <a:endParaRPr/>
+            <a:pPr/>
           </a:p>
         </p:txBody>
       </p:sp>
       <p:sp>
         <p:nvSpPr>
           <p:cNvPr id="25" name="Shape 25"/>
-          <p:cNvSpPr>
-            <a:spLocks noGrp="1"/>
-          </p:cNvSpPr>
+          <p:cNvSpPr/>
           <p:nvPr>
             <p:ph type="body" sz="quarter" idx="1"/>
           </p:nvPr>
@@ -385,7 +380,7 @@
           <a:bodyPr/>
           <a:lstStyle/>
           <a:p>
-            <a:endParaRPr/>
+            <a:pPr/>
           </a:p>
         </p:txBody>
       </p:sp>
@@ -470,7 +465,7 @@
 </file>
 
 <file path=ppt/slideLayouts/slideLayout1.xml><?xml version="1.0" encoding="utf-8"?>
-<p:sldLayout xmlns:a="http://schemas.openxmlformats.org/drawingml/2006/main" xmlns:r="http://schemas.openxmlformats.org/officeDocument/2006/relationships" xmlns:p="http://schemas.openxmlformats.org/presentationml/2006/main" type="tx">
+<p:sldLayout xmlns:a="http://schemas.openxmlformats.org/drawingml/2006/main" xmlns:r="http://schemas.openxmlformats.org/officeDocument/2006/relationships" xmlns:p="http://schemas.openxmlformats.org/presentationml/2006/main" xmlns:m="http://schemas.openxmlformats.org/officeDocument/2006/math" xmlns:a14="http://schemas.microsoft.com/office/drawing/2010/main" type="tx" showMasterSp="1" showMasterPhAnim="1">
   <p:cSld name="Blank">
     <p:spTree>
       <p:nvGrpSpPr>
@@ -489,9 +484,7 @@
       <p:sp>
         <p:nvSpPr>
           <p:cNvPr id="11" name="Número de diapositiva"/>
-          <p:cNvSpPr txBox="1">
-            <a:spLocks noGrp="1"/>
-          </p:cNvSpPr>
+          <p:cNvSpPr txBox="1"/>
           <p:nvPr>
             <p:ph type="sldNum" sz="quarter" idx="2"/>
           </p:nvPr>
@@ -505,10 +498,8 @@
           <a:bodyPr/>
           <a:lstStyle/>
           <a:p>
-            <a:fld id="{86CB4B4D-7CA3-9044-876B-883B54F8677D}" type="slidenum">
-              <a:t>‹Nº›</a:t>
-            </a:fld>
-            <a:endParaRPr/>
+            <a:pPr/>
+            <a:fld id="{86CB4B4D-7CA3-9044-876B-883B54F8677D}" type="slidenum"/>
           </a:p>
         </p:txBody>
       </p:sp>
@@ -517,12 +508,12 @@
   <p:clrMapOvr>
     <a:masterClrMapping/>
   </p:clrMapOvr>
-  <p:transition spd="med"/>
+  <p:transition xmlns:p14="http://schemas.microsoft.com/office/powerpoint/2010/main" spd="med" advClick="1"/>
 </p:sldLayout>
 </file>
 
 <file path=ppt/slideLayouts/slideLayout2.xml><?xml version="1.0" encoding="utf-8"?>
-<p:sldLayout xmlns:a="http://schemas.openxmlformats.org/drawingml/2006/main" xmlns:r="http://schemas.openxmlformats.org/officeDocument/2006/relationships" xmlns:p="http://schemas.openxmlformats.org/presentationml/2006/main" type="tx">
+<p:sldLayout xmlns:a="http://schemas.openxmlformats.org/drawingml/2006/main" xmlns:r="http://schemas.openxmlformats.org/officeDocument/2006/relationships" xmlns:p="http://schemas.openxmlformats.org/presentationml/2006/main" xmlns:m="http://schemas.openxmlformats.org/officeDocument/2006/math" xmlns:a14="http://schemas.microsoft.com/office/drawing/2010/main" type="tx" showMasterSp="1" showMasterPhAnim="1">
   <p:cSld name="Blank">
     <p:spTree>
       <p:nvGrpSpPr>
@@ -541,9 +532,7 @@
       <p:sp>
         <p:nvSpPr>
           <p:cNvPr id="18" name="Número de diapositiva"/>
-          <p:cNvSpPr txBox="1">
-            <a:spLocks noGrp="1"/>
-          </p:cNvSpPr>
+          <p:cNvSpPr txBox="1"/>
           <p:nvPr>
             <p:ph type="sldNum" sz="quarter" idx="2"/>
           </p:nvPr>
@@ -557,10 +546,8 @@
           <a:bodyPr/>
           <a:lstStyle/>
           <a:p>
-            <a:fld id="{86CB4B4D-7CA3-9044-876B-883B54F8677D}" type="slidenum">
-              <a:t>‹Nº›</a:t>
-            </a:fld>
-            <a:endParaRPr/>
+            <a:pPr/>
+            <a:fld id="{86CB4B4D-7CA3-9044-876B-883B54F8677D}" type="slidenum"/>
           </a:p>
         </p:txBody>
       </p:sp>
@@ -569,19 +556,18 @@
   <p:clrMapOvr>
     <a:masterClrMapping/>
   </p:clrMapOvr>
-  <p:transition spd="med"/>
+  <p:transition xmlns:p14="http://schemas.microsoft.com/office/powerpoint/2010/main" spd="med" advClick="1"/>
 </p:sldLayout>
 </file>
 
 <file path=ppt/slideMasters/slideMaster1.xml><?xml version="1.0" encoding="utf-8"?>
-<p:sldMaster xmlns:a="http://schemas.openxmlformats.org/drawingml/2006/main" xmlns:r="http://schemas.openxmlformats.org/officeDocument/2006/relationships" xmlns:p="http://schemas.openxmlformats.org/presentationml/2006/main">
+<p:sldMaster xmlns:a="http://schemas.openxmlformats.org/drawingml/2006/main" xmlns:r="http://schemas.openxmlformats.org/officeDocument/2006/relationships" xmlns:p="http://schemas.openxmlformats.org/presentationml/2006/main" xmlns:m="http://schemas.openxmlformats.org/officeDocument/2006/math" xmlns:a14="http://schemas.microsoft.com/office/drawing/2010/main">
   <p:cSld>
     <p:bg>
       <p:bgPr>
         <a:solidFill>
           <a:srgbClr val="FFFFFF"/>
         </a:solidFill>
-        <a:effectLst/>
       </p:bgPr>
     </p:bg>
     <p:spTree>
@@ -601,9 +587,7 @@
       <p:sp>
         <p:nvSpPr>
           <p:cNvPr id="2" name="Texto del título"/>
-          <p:cNvSpPr txBox="1">
-            <a:spLocks noGrp="1"/>
-          </p:cNvSpPr>
+          <p:cNvSpPr txBox="1"/>
           <p:nvPr>
             <p:ph type="title"/>
           </p:nvPr>
@@ -621,7 +605,7 @@
           </a:ln>
           <a:extLst>
             <a:ext uri="{C572A759-6A51-4108-AA02-DFA0A04FC94B}">
-              <ma14:wrappingTextBoxFlag xmlns:ma14="http://schemas.microsoft.com/office/mac/drawingml/2011/main" xmlns:a14="http://schemas.microsoft.com/office/drawing/2010/main" xmlns:m="http://schemas.openxmlformats.org/officeDocument/2006/math" xmlns="" val="1"/>
+              <ma14:wrappingTextBoxFlag xmlns:ma14="http://schemas.microsoft.com/office/mac/drawingml/2011/main" val="1"/>
             </a:ext>
           </a:extLst>
         </p:spPr>
@@ -629,6 +613,7 @@
           <a:bodyPr lIns="190500" tIns="190500" rIns="190500" bIns="190500" anchor="ctr"/>
           <a:lstStyle/>
           <a:p>
+            <a:pPr/>
             <a:r>
               <a:t>Texto del título</a:t>
             </a:r>
@@ -638,9 +623,7 @@
       <p:sp>
         <p:nvSpPr>
           <p:cNvPr id="3" name="Nivel de texto 1…"/>
-          <p:cNvSpPr txBox="1">
-            <a:spLocks noGrp="1"/>
-          </p:cNvSpPr>
+          <p:cNvSpPr txBox="1"/>
           <p:nvPr>
             <p:ph type="body" idx="1"/>
           </p:nvPr>
@@ -658,7 +641,7 @@
           </a:ln>
           <a:extLst>
             <a:ext uri="{C572A759-6A51-4108-AA02-DFA0A04FC94B}">
-              <ma14:wrappingTextBoxFlag xmlns:ma14="http://schemas.microsoft.com/office/mac/drawingml/2011/main" xmlns:a14="http://schemas.microsoft.com/office/drawing/2010/main" xmlns:m="http://schemas.openxmlformats.org/officeDocument/2006/math" xmlns="" val="1"/>
+              <ma14:wrappingTextBoxFlag xmlns:ma14="http://schemas.microsoft.com/office/mac/drawingml/2011/main" val="1"/>
             </a:ext>
           </a:extLst>
         </p:spPr>
@@ -666,6 +649,7 @@
           <a:bodyPr lIns="190500" tIns="190500" rIns="190500" bIns="190500" anchor="ctr"/>
           <a:lstStyle/>
           <a:p>
+            <a:pPr/>
             <a:r>
               <a:t>Nivel de texto 1</a:t>
             </a:r>
@@ -699,9 +683,7 @@
       <p:sp>
         <p:nvSpPr>
           <p:cNvPr id="4" name="Número de diapositiva"/>
-          <p:cNvSpPr txBox="1">
-            <a:spLocks noGrp="1"/>
-          </p:cNvSpPr>
+          <p:cNvSpPr txBox="1"/>
           <p:nvPr>
             <p:ph type="sldNum" sz="quarter" idx="2"/>
           </p:nvPr>
@@ -733,10 +715,8 @@
             </a:lvl1pPr>
           </a:lstStyle>
           <a:p>
-            <a:fld id="{86CB4B4D-7CA3-9044-876B-883B54F8677D}" type="slidenum">
-              <a:t>‹Nº›</a:t>
-            </a:fld>
-            <a:endParaRPr/>
+            <a:pPr/>
+            <a:fld id="{86CB4B4D-7CA3-9044-876B-883B54F8677D}" type="slidenum"/>
           </a:p>
         </p:txBody>
       </p:sp>
@@ -744,10 +724,10 @@
   </p:cSld>
   <p:clrMap bg1="lt1" tx1="dk1" bg2="lt2" tx2="dk2" accent1="accent1" accent2="accent2" accent3="accent3" accent4="accent4" accent5="accent5" accent6="accent6" hlink="hlink" folHlink="folHlink"/>
   <p:sldLayoutIdLst>
-    <p:sldLayoutId id="2147483649" r:id="rId1"/>
-    <p:sldLayoutId id="2147483650" r:id="rId2"/>
+    <p:sldLayoutId id="2147483649" r:id="rId2"/>
+    <p:sldLayoutId id="2147483650" r:id="rId3"/>
   </p:sldLayoutIdLst>
-  <p:transition spd="med"/>
+  <p:transition xmlns:p14="http://schemas.microsoft.com/office/powerpoint/2010/main" spd="med" advClick="1"/>
   <p:txStyles>
     <p:titleStyle>
       <a:lvl1pPr marL="0" marR="0" indent="0" algn="ctr" defTabSz="3048000" latinLnBrk="0">
@@ -765,7 +745,7 @@
         <a:buFontTx/>
         <a:buNone/>
         <a:tabLst/>
-        <a:defRPr sz="42600" b="0" i="0" u="none" strike="noStrike" cap="none" spc="0" baseline="0">
+        <a:defRPr b="0" baseline="0" cap="none" i="0" spc="0" strike="noStrike" sz="42600" u="none">
           <a:ln>
             <a:noFill/>
           </a:ln>
@@ -794,7 +774,7 @@
         <a:buFontTx/>
         <a:buNone/>
         <a:tabLst/>
-        <a:defRPr sz="42600" b="0" i="0" u="none" strike="noStrike" cap="none" spc="0" baseline="0">
+        <a:defRPr b="0" baseline="0" cap="none" i="0" spc="0" strike="noStrike" sz="42600" u="none">
           <a:ln>
             <a:noFill/>
           </a:ln>
@@ -823,7 +803,7 @@
         <a:buFontTx/>
         <a:buNone/>
         <a:tabLst/>
-        <a:defRPr sz="42600" b="0" i="0" u="none" strike="noStrike" cap="none" spc="0" baseline="0">
+        <a:defRPr b="0" baseline="0" cap="none" i="0" spc="0" strike="noStrike" sz="42600" u="none">
           <a:ln>
             <a:noFill/>
           </a:ln>
@@ -852,7 +832,7 @@
         <a:buFontTx/>
         <a:buNone/>
         <a:tabLst/>
-        <a:defRPr sz="42600" b="0" i="0" u="none" strike="noStrike" cap="none" spc="0" baseline="0">
+        <a:defRPr b="0" baseline="0" cap="none" i="0" spc="0" strike="noStrike" sz="42600" u="none">
           <a:ln>
             <a:noFill/>
           </a:ln>
@@ -881,7 +861,7 @@
         <a:buFontTx/>
         <a:buNone/>
         <a:tabLst/>
-        <a:defRPr sz="42600" b="0" i="0" u="none" strike="noStrike" cap="none" spc="0" baseline="0">
+        <a:defRPr b="0" baseline="0" cap="none" i="0" spc="0" strike="noStrike" sz="42600" u="none">
           <a:ln>
             <a:noFill/>
           </a:ln>
@@ -910,7 +890,7 @@
         <a:buFontTx/>
         <a:buNone/>
         <a:tabLst/>
-        <a:defRPr sz="42600" b="0" i="0" u="none" strike="noStrike" cap="none" spc="0" baseline="0">
+        <a:defRPr b="0" baseline="0" cap="none" i="0" spc="0" strike="noStrike" sz="42600" u="none">
           <a:ln>
             <a:noFill/>
           </a:ln>
@@ -939,7 +919,7 @@
         <a:buFontTx/>
         <a:buNone/>
         <a:tabLst/>
-        <a:defRPr sz="42600" b="0" i="0" u="none" strike="noStrike" cap="none" spc="0" baseline="0">
+        <a:defRPr b="0" baseline="0" cap="none" i="0" spc="0" strike="noStrike" sz="42600" u="none">
           <a:ln>
             <a:noFill/>
           </a:ln>
@@ -968,7 +948,7 @@
         <a:buFontTx/>
         <a:buNone/>
         <a:tabLst/>
-        <a:defRPr sz="42600" b="0" i="0" u="none" strike="noStrike" cap="none" spc="0" baseline="0">
+        <a:defRPr b="0" baseline="0" cap="none" i="0" spc="0" strike="noStrike" sz="42600" u="none">
           <a:ln>
             <a:noFill/>
           </a:ln>
@@ -997,7 +977,7 @@
         <a:buFontTx/>
         <a:buNone/>
         <a:tabLst/>
-        <a:defRPr sz="42600" b="0" i="0" u="none" strike="noStrike" cap="none" spc="0" baseline="0">
+        <a:defRPr b="0" baseline="0" cap="none" i="0" spc="0" strike="noStrike" sz="42600" u="none">
           <a:ln>
             <a:noFill/>
           </a:ln>
@@ -1028,7 +1008,7 @@
         <a:buFontTx/>
         <a:buChar char="•"/>
         <a:tabLst/>
-        <a:defRPr sz="21200" b="0" i="0" u="none" strike="noStrike" cap="none" spc="0" baseline="0">
+        <a:defRPr b="0" baseline="0" cap="none" i="0" spc="0" strike="noStrike" sz="21200" u="none">
           <a:ln>
             <a:noFill/>
           </a:ln>
@@ -1057,7 +1037,7 @@
         <a:buFontTx/>
         <a:buChar char="•"/>
         <a:tabLst/>
-        <a:defRPr sz="21200" b="0" i="0" u="none" strike="noStrike" cap="none" spc="0" baseline="0">
+        <a:defRPr b="0" baseline="0" cap="none" i="0" spc="0" strike="noStrike" sz="21200" u="none">
           <a:ln>
             <a:noFill/>
           </a:ln>
@@ -1086,7 +1066,7 @@
         <a:buFontTx/>
         <a:buChar char="•"/>
         <a:tabLst/>
-        <a:defRPr sz="21200" b="0" i="0" u="none" strike="noStrike" cap="none" spc="0" baseline="0">
+        <a:defRPr b="0" baseline="0" cap="none" i="0" spc="0" strike="noStrike" sz="21200" u="none">
           <a:ln>
             <a:noFill/>
           </a:ln>
@@ -1115,7 +1095,7 @@
         <a:buFontTx/>
         <a:buChar char="•"/>
         <a:tabLst/>
-        <a:defRPr sz="21200" b="0" i="0" u="none" strike="noStrike" cap="none" spc="0" baseline="0">
+        <a:defRPr b="0" baseline="0" cap="none" i="0" spc="0" strike="noStrike" sz="21200" u="none">
           <a:ln>
             <a:noFill/>
           </a:ln>
@@ -1144,7 +1124,7 @@
         <a:buFontTx/>
         <a:buChar char="•"/>
         <a:tabLst/>
-        <a:defRPr sz="21200" b="0" i="0" u="none" strike="noStrike" cap="none" spc="0" baseline="0">
+        <a:defRPr b="0" baseline="0" cap="none" i="0" spc="0" strike="noStrike" sz="21200" u="none">
           <a:ln>
             <a:noFill/>
           </a:ln>
@@ -1173,7 +1153,7 @@
         <a:buFontTx/>
         <a:buChar char="•"/>
         <a:tabLst/>
-        <a:defRPr sz="21200" b="0" i="0" u="none" strike="noStrike" cap="none" spc="0" baseline="0">
+        <a:defRPr b="0" baseline="0" cap="none" i="0" spc="0" strike="noStrike" sz="21200" u="none">
           <a:ln>
             <a:noFill/>
           </a:ln>
@@ -1202,7 +1182,7 @@
         <a:buFontTx/>
         <a:buChar char="•"/>
         <a:tabLst/>
-        <a:defRPr sz="21200" b="0" i="0" u="none" strike="noStrike" cap="none" spc="0" baseline="0">
+        <a:defRPr b="0" baseline="0" cap="none" i="0" spc="0" strike="noStrike" sz="21200" u="none">
           <a:ln>
             <a:noFill/>
           </a:ln>
@@ -1231,7 +1211,7 @@
         <a:buFontTx/>
         <a:buChar char="•"/>
         <a:tabLst/>
-        <a:defRPr sz="21200" b="0" i="0" u="none" strike="noStrike" cap="none" spc="0" baseline="0">
+        <a:defRPr b="0" baseline="0" cap="none" i="0" spc="0" strike="noStrike" sz="21200" u="none">
           <a:ln>
             <a:noFill/>
           </a:ln>
@@ -1260,7 +1240,7 @@
         <a:buFontTx/>
         <a:buChar char="•"/>
         <a:tabLst/>
-        <a:defRPr sz="21200" b="0" i="0" u="none" strike="noStrike" cap="none" spc="0" baseline="0">
+        <a:defRPr b="0" baseline="0" cap="none" i="0" spc="0" strike="noStrike" sz="21200" u="none">
           <a:ln>
             <a:noFill/>
           </a:ln>
@@ -1291,7 +1271,7 @@
         <a:buFontTx/>
         <a:buNone/>
         <a:tabLst/>
-        <a:defRPr sz="9200" b="0" i="0" u="none" strike="noStrike" cap="none" spc="0" baseline="0">
+        <a:defRPr b="0" baseline="0" cap="none" i="0" spc="0" strike="noStrike" sz="9200" u="none">
           <a:ln>
             <a:noFill/>
           </a:ln>
@@ -1320,7 +1300,7 @@
         <a:buFontTx/>
         <a:buNone/>
         <a:tabLst/>
-        <a:defRPr sz="9200" b="0" i="0" u="none" strike="noStrike" cap="none" spc="0" baseline="0">
+        <a:defRPr b="0" baseline="0" cap="none" i="0" spc="0" strike="noStrike" sz="9200" u="none">
           <a:ln>
             <a:noFill/>
           </a:ln>
@@ -1349,7 +1329,7 @@
         <a:buFontTx/>
         <a:buNone/>
         <a:tabLst/>
-        <a:defRPr sz="9200" b="0" i="0" u="none" strike="noStrike" cap="none" spc="0" baseline="0">
+        <a:defRPr b="0" baseline="0" cap="none" i="0" spc="0" strike="noStrike" sz="9200" u="none">
           <a:ln>
             <a:noFill/>
           </a:ln>
@@ -1378,7 +1358,7 @@
         <a:buFontTx/>
         <a:buNone/>
         <a:tabLst/>
-        <a:defRPr sz="9200" b="0" i="0" u="none" strike="noStrike" cap="none" spc="0" baseline="0">
+        <a:defRPr b="0" baseline="0" cap="none" i="0" spc="0" strike="noStrike" sz="9200" u="none">
           <a:ln>
             <a:noFill/>
           </a:ln>
@@ -1407,7 +1387,7 @@
         <a:buFontTx/>
         <a:buNone/>
         <a:tabLst/>
-        <a:defRPr sz="9200" b="0" i="0" u="none" strike="noStrike" cap="none" spc="0" baseline="0">
+        <a:defRPr b="0" baseline="0" cap="none" i="0" spc="0" strike="noStrike" sz="9200" u="none">
           <a:ln>
             <a:noFill/>
           </a:ln>
@@ -1436,7 +1416,7 @@
         <a:buFontTx/>
         <a:buNone/>
         <a:tabLst/>
-        <a:defRPr sz="9200" b="0" i="0" u="none" strike="noStrike" cap="none" spc="0" baseline="0">
+        <a:defRPr b="0" baseline="0" cap="none" i="0" spc="0" strike="noStrike" sz="9200" u="none">
           <a:ln>
             <a:noFill/>
           </a:ln>
@@ -1465,7 +1445,7 @@
         <a:buFontTx/>
         <a:buNone/>
         <a:tabLst/>
-        <a:defRPr sz="9200" b="0" i="0" u="none" strike="noStrike" cap="none" spc="0" baseline="0">
+        <a:defRPr b="0" baseline="0" cap="none" i="0" spc="0" strike="noStrike" sz="9200" u="none">
           <a:ln>
             <a:noFill/>
           </a:ln>
@@ -1494,7 +1474,7 @@
         <a:buFontTx/>
         <a:buNone/>
         <a:tabLst/>
-        <a:defRPr sz="9200" b="0" i="0" u="none" strike="noStrike" cap="none" spc="0" baseline="0">
+        <a:defRPr b="0" baseline="0" cap="none" i="0" spc="0" strike="noStrike" sz="9200" u="none">
           <a:ln>
             <a:noFill/>
           </a:ln>
@@ -1523,7 +1503,7 @@
         <a:buFontTx/>
         <a:buNone/>
         <a:tabLst/>
-        <a:defRPr sz="9200" b="0" i="0" u="none" strike="noStrike" cap="none" spc="0" baseline="0">
+        <a:defRPr b="0" baseline="0" cap="none" i="0" spc="0" strike="noStrike" sz="9200" u="none">
           <a:ln>
             <a:noFill/>
           </a:ln>
@@ -1543,7 +1523,7 @@
 </file>
 
 <file path=ppt/slides/slide1.xml><?xml version="1.0" encoding="utf-8"?>
-<p:sld xmlns:a="http://schemas.openxmlformats.org/drawingml/2006/main" xmlns:r="http://schemas.openxmlformats.org/officeDocument/2006/relationships" xmlns:p="http://schemas.openxmlformats.org/presentationml/2006/main">
+<p:sld xmlns:a="http://schemas.openxmlformats.org/drawingml/2006/main" xmlns:r="http://schemas.openxmlformats.org/officeDocument/2006/relationships" xmlns:p="http://schemas.openxmlformats.org/presentationml/2006/main" xmlns:m="http://schemas.openxmlformats.org/officeDocument/2006/math" xmlns:a14="http://schemas.microsoft.com/office/drawing/2010/main" showMasterSp="1" showMasterPhAnim="1">
   <p:cSld>
     <p:spTree>
       <p:nvGrpSpPr>
@@ -1592,7 +1572,7 @@
                   <a:srgbClr val="FFFFFF"/>
                 </a:solidFill>
                 <a:effectLst>
-                  <a:outerShdw blurRad="38100" dist="12700" dir="5400000" rotWithShape="0">
+                  <a:outerShdw sx="100000" sy="100000" kx="0" ky="0" algn="b" rotWithShape="0" blurRad="38100" dist="12700" dir="5400000">
                     <a:srgbClr val="000000">
                       <a:alpha val="50000"/>
                     </a:srgbClr>
@@ -1604,7 +1584,6 @@
                 <a:sym typeface="Gill Sans"/>
               </a:defRPr>
             </a:pPr>
-            <a:endParaRPr/>
           </a:p>
         </p:txBody>
       </p:sp>
@@ -1641,7 +1620,7 @@
                   <a:srgbClr val="FFFFFF"/>
                 </a:solidFill>
                 <a:effectLst>
-                  <a:outerShdw blurRad="38100" dist="12700" dir="5400000" rotWithShape="0">
+                  <a:outerShdw sx="100000" sy="100000" kx="0" ky="0" algn="b" rotWithShape="0" blurRad="38100" dist="12700" dir="5400000">
                     <a:srgbClr val="000000">
                       <a:alpha val="50000"/>
                     </a:srgbClr>
@@ -1653,7 +1632,6 @@
                 <a:sym typeface="Gill Sans"/>
               </a:defRPr>
             </a:pPr>
-            <a:endParaRPr/>
           </a:p>
         </p:txBody>
       </p:sp>
@@ -1722,7 +1700,7 @@
                   <a:srgbClr val="FFFFFF"/>
                 </a:solidFill>
                 <a:effectLst>
-                  <a:outerShdw blurRad="38100" dist="12700" dir="5400000" rotWithShape="0">
+                  <a:outerShdw sx="100000" sy="100000" kx="0" ky="0" algn="b" rotWithShape="0" blurRad="38100" dist="12700" dir="5400000">
                     <a:srgbClr val="000000">
                       <a:alpha val="50000"/>
                     </a:srgbClr>
@@ -1734,7 +1712,6 @@
                 <a:sym typeface="Gill Sans"/>
               </a:defRPr>
             </a:pPr>
-            <a:endParaRPr/>
           </a:p>
         </p:txBody>
       </p:sp>
@@ -1800,7 +1777,7 @@
                   <a:srgbClr val="FFFFFF"/>
                 </a:solidFill>
                 <a:effectLst>
-                  <a:outerShdw blurRad="38100" dist="12700" dir="5400000" rotWithShape="0">
+                  <a:outerShdw sx="100000" sy="100000" kx="0" ky="0" algn="b" rotWithShape="0" blurRad="38100" dist="12700" dir="5400000">
                     <a:srgbClr val="000000">
                       <a:alpha val="50000"/>
                     </a:srgbClr>
@@ -1812,7 +1789,6 @@
                 <a:sym typeface="Gill Sans"/>
               </a:defRPr>
             </a:pPr>
-            <a:endParaRPr/>
           </a:p>
         </p:txBody>
       </p:sp>
@@ -1849,7 +1825,7 @@
                   <a:srgbClr val="FFFFFF"/>
                 </a:solidFill>
                 <a:effectLst>
-                  <a:outerShdw blurRad="38100" dist="12700" dir="5400000" rotWithShape="0">
+                  <a:outerShdw sx="100000" sy="100000" kx="0" ky="0" algn="b" rotWithShape="0" blurRad="38100" dist="12700" dir="5400000">
                     <a:srgbClr val="000000">
                       <a:alpha val="50000"/>
                     </a:srgbClr>
@@ -1861,7 +1837,6 @@
                 <a:sym typeface="Arial"/>
               </a:defRPr>
             </a:pPr>
-            <a:endParaRPr/>
           </a:p>
         </p:txBody>
       </p:sp>
@@ -1919,7 +1894,6 @@
                   <a:sym typeface="Helvetica Light"/>
                 </a:defRPr>
               </a:pPr>
-              <a:endParaRPr/>
             </a:p>
           </p:txBody>
         </p:sp>
@@ -1986,7 +1960,6 @@
                 </a:solidFill>
               </a:defRPr>
             </a:pPr>
-            <a:endParaRPr/>
           </a:p>
         </p:txBody>
       </p:sp>
@@ -2009,7 +1982,7 @@
           </a:ln>
           <a:extLst>
             <a:ext uri="{C572A759-6A51-4108-AA02-DFA0A04FC94B}">
-              <ma14:wrappingTextBoxFlag xmlns:ma14="http://schemas.microsoft.com/office/mac/drawingml/2011/main" xmlns:a14="http://schemas.microsoft.com/office/drawing/2010/main" xmlns:m="http://schemas.openxmlformats.org/officeDocument/2006/math" xmlns="" val="1"/>
+              <ma14:wrappingTextBoxFlag xmlns:ma14="http://schemas.microsoft.com/office/mac/drawingml/2011/main" val="1"/>
             </a:ext>
           </a:extLst>
         </p:spPr>
@@ -2048,7 +2021,15 @@
                   <a:srgbClr val="797979"/>
                 </a:solidFill>
               </a:rPr>
-              <a:t> jer@iaa.es</a:t>
+              <a:t> </a:t>
+            </a:r>
+            <a:r>
+              <a:rPr b="1">
+                <a:solidFill>
+                  <a:srgbClr val="797979"/>
+                </a:solidFill>
+              </a:rPr>
+              <a:t>jer@iaa.es</a:t>
             </a:r>
           </a:p>
         </p:txBody>
@@ -2072,7 +2053,7 @@
           </a:ln>
           <a:extLst>
             <a:ext uri="{C572A759-6A51-4108-AA02-DFA0A04FC94B}">
-              <ma14:wrappingTextBoxFlag xmlns:ma14="http://schemas.microsoft.com/office/mac/drawingml/2011/main" xmlns:a14="http://schemas.microsoft.com/office/drawing/2010/main" xmlns:m="http://schemas.openxmlformats.org/officeDocument/2006/math" xmlns="" val="1"/>
+              <ma14:wrappingTextBoxFlag xmlns:ma14="http://schemas.microsoft.com/office/mac/drawingml/2011/main" val="1"/>
             </a:ext>
           </a:extLst>
         </p:spPr>
@@ -2094,6 +2075,7 @@
             </a:lvl1pPr>
           </a:lstStyle>
           <a:p>
+            <a:pPr/>
             <a:r>
               <a:t> </a:t>
             </a:r>
@@ -2235,7 +2217,7 @@
           </a:ln>
           <a:extLst>
             <a:ext uri="{C572A759-6A51-4108-AA02-DFA0A04FC94B}">
-              <ma14:wrappingTextBoxFlag xmlns:ma14="http://schemas.microsoft.com/office/mac/drawingml/2011/main" xmlns:a14="http://schemas.microsoft.com/office/drawing/2010/main" xmlns:m="http://schemas.openxmlformats.org/officeDocument/2006/math" xmlns="" val="1"/>
+              <ma14:wrappingTextBoxFlag xmlns:ma14="http://schemas.microsoft.com/office/mac/drawingml/2011/main" val="1"/>
             </a:ext>
           </a:extLst>
         </p:spPr>
@@ -2246,15 +2228,18 @@
           <a:lstStyle/>
           <a:p>
             <a:pPr algn="ctr" defTabSz="3048000">
-              <a:defRPr sz="8300" b="1"/>
+              <a:defRPr b="1" sz="8300"/>
             </a:pPr>
             <a:r>
-              <a:t>Versioned executable user documentation </a:t>
+              <a:t>Versioned </a:t>
+            </a:r>
+            <a:r>
+              <a:t>executable user documentation </a:t>
             </a:r>
           </a:p>
           <a:p>
             <a:pPr algn="ctr" defTabSz="3048000">
-              <a:defRPr sz="8300" b="1"/>
+              <a:defRPr b="1" sz="8300"/>
             </a:pPr>
             <a:r>
               <a:t>for in-development science tools</a:t>
@@ -2281,7 +2266,7 @@
           </a:ln>
           <a:extLst>
             <a:ext uri="{C572A759-6A51-4108-AA02-DFA0A04FC94B}">
-              <ma14:wrappingTextBoxFlag xmlns:ma14="http://schemas.microsoft.com/office/mac/drawingml/2011/main" xmlns:a14="http://schemas.microsoft.com/office/drawing/2010/main" xmlns:m="http://schemas.openxmlformats.org/officeDocument/2006/math" xmlns="" val="1"/>
+              <ma14:wrappingTextBoxFlag xmlns:ma14="http://schemas.microsoft.com/office/mac/drawingml/2011/main" val="1"/>
             </a:ext>
           </a:extLst>
         </p:spPr>
@@ -2378,8 +2363,8 @@
         </p:nvSpPr>
         <p:spPr>
           <a:xfrm>
-            <a:off x="1859099" y="5084748"/>
-            <a:ext cx="31611468" cy="1332352"/>
+            <a:off x="2445035" y="5005312"/>
+            <a:ext cx="31025531" cy="1202665"/>
           </a:xfrm>
           <a:prstGeom prst="rect">
             <a:avLst/>
@@ -2389,12 +2374,12 @@
           </a:ln>
           <a:extLst>
             <a:ext uri="{C572A759-6A51-4108-AA02-DFA0A04FC94B}">
-              <ma14:wrappingTextBoxFlag xmlns:ma14="http://schemas.microsoft.com/office/mac/drawingml/2011/main" xmlns:a14="http://schemas.microsoft.com/office/drawing/2010/main" xmlns:m="http://schemas.openxmlformats.org/officeDocument/2006/math" xmlns="" val="1"/>
+              <ma14:wrappingTextBoxFlag xmlns:ma14="http://schemas.microsoft.com/office/mac/drawingml/2011/main" val="1"/>
             </a:ext>
           </a:extLst>
         </p:spPr>
         <p:txBody>
-          <a:bodyPr wrap="square" lIns="0" tIns="0" rIns="0" bIns="0">
+          <a:bodyPr lIns="0" tIns="0" rIns="0" bIns="0">
             <a:spAutoFit/>
           </a:bodyPr>
           <a:lstStyle/>
@@ -2411,56 +2396,42 @@
               </a:defRPr>
             </a:pPr>
             <a:r>
-              <a:rPr dirty="0"/>
               <a:t>Catherine Boisson</a:t>
             </a:r>
             <a:r>
-              <a:rPr baseline="31999" dirty="0"/>
+              <a:rPr baseline="31999"/>
               <a:t>1</a:t>
             </a:r>
             <a:r>
-              <a:rPr dirty="0"/>
               <a:t>, José Enrique Ruiz</a:t>
             </a:r>
             <a:r>
-              <a:rPr baseline="31999" dirty="0"/>
+              <a:rPr baseline="31999"/>
               <a:t>2</a:t>
             </a:r>
             <a:r>
-              <a:rPr dirty="0"/>
               <a:t>, Christoph Deil</a:t>
             </a:r>
             <a:r>
-              <a:rPr baseline="31999" dirty="0"/>
+              <a:rPr baseline="31999"/>
               <a:t>3</a:t>
             </a:r>
             <a:r>
-              <a:rPr dirty="0"/>
               <a:t>, Axel Donath</a:t>
             </a:r>
             <a:r>
-              <a:rPr baseline="31999" dirty="0"/>
+              <a:rPr baseline="31999"/>
               <a:t>3</a:t>
             </a:r>
             <a:r>
-              <a:rPr dirty="0"/>
               <a:t> and Bruno Khelifi</a:t>
             </a:r>
             <a:r>
-              <a:rPr baseline="31999" dirty="0"/>
+              <a:rPr baseline="31999"/>
               <a:t>4</a:t>
             </a:r>
             <a:r>
-              <a:rPr dirty="0"/>
-              <a:t> for the </a:t>
-            </a:r>
-            <a:r>
-              <a:rPr dirty="0" err="1"/>
-              <a:t>Gammapy</a:t>
-            </a:r>
-            <a:r>
-              <a:rPr dirty="0"/>
-              <a:t> team.</a:t>
+              <a:t> for the Gammapy team.</a:t>
             </a:r>
           </a:p>
           <a:p>
@@ -2476,100 +2447,32 @@
               </a:defRPr>
             </a:pPr>
             <a:r>
-              <a:rPr baseline="31999" dirty="0"/>
+              <a:rPr baseline="31999"/>
               <a:t>1</a:t>
             </a:r>
             <a:r>
-              <a:rPr dirty="0"/>
-              <a:t> LUTH - </a:t>
-            </a:r>
-            <a:r>
-              <a:rPr dirty="0" err="1"/>
-              <a:t>Observatoire</a:t>
-            </a:r>
-            <a:r>
-              <a:rPr dirty="0"/>
-              <a:t> de Paris, </a:t>
-            </a:r>
-            <a:r>
-              <a:rPr baseline="31999" dirty="0"/>
+              <a:t> LUTH - Observatoire de Paris, </a:t>
+            </a:r>
+            <a:r>
+              <a:rPr baseline="31999"/>
               <a:t>2</a:t>
             </a:r>
             <a:r>
-              <a:rPr dirty="0"/>
-              <a:t> Instituto de </a:t>
-            </a:r>
-            <a:r>
-              <a:rPr dirty="0" err="1"/>
-              <a:t>Astrofísica</a:t>
-            </a:r>
-            <a:r>
-              <a:rPr dirty="0"/>
-              <a:t> de Andalucía - CSIC, </a:t>
-            </a:r>
-            <a:r>
-              <a:rPr baseline="31999" dirty="0"/>
+              <a:t> Instituto de Astrofísica de Andalucía - CSIC, </a:t>
+            </a:r>
+            <a:r>
+              <a:rPr baseline="31999"/>
               <a:t>3</a:t>
             </a:r>
             <a:r>
-              <a:rPr dirty="0"/>
-              <a:t> Max-Planck-</a:t>
-            </a:r>
-            <a:r>
-              <a:rPr dirty="0" err="1"/>
-              <a:t>Institut</a:t>
-            </a:r>
-            <a:r>
-              <a:rPr dirty="0"/>
-              <a:t> </a:t>
-            </a:r>
-            <a:r>
-              <a:rPr dirty="0" err="1"/>
-              <a:t>für</a:t>
-            </a:r>
-            <a:r>
-              <a:rPr dirty="0"/>
-              <a:t> </a:t>
-            </a:r>
-            <a:r>
-              <a:rPr dirty="0" err="1"/>
-              <a:t>Kernphysik</a:t>
-            </a:r>
-            <a:r>
-              <a:rPr dirty="0"/>
-              <a:t>, </a:t>
-            </a:r>
-            <a:r>
-              <a:rPr baseline="31999" dirty="0"/>
+              <a:t> Max-Planck-Institut für Kernphysik, </a:t>
+            </a:r>
+            <a:r>
+              <a:rPr baseline="31999"/>
               <a:t>4 </a:t>
             </a:r>
             <a:r>
-              <a:rPr dirty="0"/>
-              <a:t>APC - </a:t>
-            </a:r>
-            <a:r>
-              <a:rPr dirty="0" err="1"/>
-              <a:t>AstroParticule</a:t>
-            </a:r>
-            <a:r>
-              <a:rPr dirty="0"/>
-              <a:t> et </a:t>
-            </a:r>
-            <a:r>
-              <a:rPr dirty="0" err="1"/>
-              <a:t>Cosmologie</a:t>
-            </a:r>
-            <a:r>
-              <a:rPr dirty="0"/>
-              <a:t>, </a:t>
-            </a:r>
-            <a:r>
-              <a:rPr dirty="0" err="1"/>
-              <a:t>Université</a:t>
-            </a:r>
-            <a:r>
-              <a:rPr dirty="0"/>
-              <a:t> Paris Diderot.</a:t>
+              <a:t>APC - AstroParticule et Cosmologie, Université Paris Diderot.</a:t>
             </a:r>
           </a:p>
         </p:txBody>
@@ -2593,7 +2496,7 @@
           </a:ln>
           <a:extLst>
             <a:ext uri="{C572A759-6A51-4108-AA02-DFA0A04FC94B}">
-              <ma14:wrappingTextBoxFlag xmlns:ma14="http://schemas.microsoft.com/office/mac/drawingml/2011/main" xmlns:a14="http://schemas.microsoft.com/office/drawing/2010/main" xmlns:m="http://schemas.openxmlformats.org/officeDocument/2006/math" xmlns="" val="1"/>
+              <ma14:wrappingTextBoxFlag xmlns:ma14="http://schemas.microsoft.com/office/mac/drawingml/2011/main" val="1"/>
             </a:ext>
           </a:extLst>
         </p:spPr>
@@ -2606,7 +2509,7 @@
               <a:spcBef>
                 <a:spcPts val="4000"/>
               </a:spcBef>
-              <a:defRPr sz="6400" b="1" spc="6">
+              <a:defRPr b="1" spc="6" sz="6400">
                 <a:solidFill>
                   <a:srgbClr val="EC3516"/>
                 </a:solidFill>
@@ -2618,6 +2521,7 @@
             </a:lvl1pPr>
           </a:lstStyle>
           <a:p>
+            <a:pPr/>
             <a:r>
               <a:t>What is Gammapy?</a:t>
             </a:r>
@@ -2643,7 +2547,7 @@
           </a:ln>
           <a:extLst>
             <a:ext uri="{C572A759-6A51-4108-AA02-DFA0A04FC94B}">
-              <ma14:wrappingTextBoxFlag xmlns:ma14="http://schemas.microsoft.com/office/mac/drawingml/2011/main" xmlns:a14="http://schemas.microsoft.com/office/drawing/2010/main" xmlns:m="http://schemas.openxmlformats.org/officeDocument/2006/math" xmlns="" val="1"/>
+              <ma14:wrappingTextBoxFlag xmlns:ma14="http://schemas.microsoft.com/office/mac/drawingml/2011/main" val="1"/>
             </a:ext>
           </a:extLst>
         </p:spPr>
@@ -2665,6 +2569,7 @@
             </a:lvl1pPr>
           </a:lstStyle>
           <a:p>
+            <a:pPr/>
             <a:r>
               <a:t> </a:t>
             </a:r>
@@ -2712,7 +2617,7 @@
           <a:blip r:embed="rId11">
             <a:extLst/>
           </a:blip>
-          <a:srcRect/>
+          <a:srcRect l="0" t="0" r="0" b="0"/>
           <a:stretch>
             <a:fillRect/>
           </a:stretch>
@@ -2807,7 +2712,7 @@
           </a:ln>
           <a:extLst>
             <a:ext uri="{C572A759-6A51-4108-AA02-DFA0A04FC94B}">
-              <ma14:wrappingTextBoxFlag xmlns:ma14="http://schemas.microsoft.com/office/mac/drawingml/2011/main" xmlns:a14="http://schemas.microsoft.com/office/drawing/2010/main" xmlns:m="http://schemas.openxmlformats.org/officeDocument/2006/math" xmlns="" val="1"/>
+              <ma14:wrappingTextBoxFlag xmlns:ma14="http://schemas.microsoft.com/office/mac/drawingml/2011/main" val="1"/>
             </a:ext>
           </a:extLst>
         </p:spPr>
@@ -2821,7 +2726,7 @@
               <a:spcBef>
                 <a:spcPts val="4000"/>
               </a:spcBef>
-              <a:defRPr sz="6400" b="1" spc="6">
+              <a:defRPr b="1" spc="6" sz="6400">
                 <a:solidFill>
                   <a:srgbClr val="EC3516"/>
                 </a:solidFill>
@@ -2834,7 +2739,7 @@
             <a:r>
               <a:t>Abstract</a:t>
             </a:r>
-            <a:endParaRPr sz="4500" spc="4">
+            <a:endParaRPr spc="4" sz="4500">
               <a:solidFill>
                 <a:srgbClr val="7F7F7F"/>
               </a:solidFill>
@@ -2845,7 +2750,7 @@
               <a:spcBef>
                 <a:spcPts val="1500"/>
               </a:spcBef>
-              <a:defRPr sz="4400" spc="4">
+              <a:defRPr spc="4" sz="4400">
                 <a:solidFill>
                   <a:srgbClr val="3C3C3C"/>
                 </a:solidFill>
@@ -2956,7 +2861,7 @@
           </a:ln>
           <a:extLst>
             <a:ext uri="{C572A759-6A51-4108-AA02-DFA0A04FC94B}">
-              <ma14:wrappingTextBoxFlag xmlns:ma14="http://schemas.microsoft.com/office/mac/drawingml/2011/main" xmlns:a14="http://schemas.microsoft.com/office/drawing/2010/main" xmlns:m="http://schemas.openxmlformats.org/officeDocument/2006/math" xmlns="" val="1"/>
+              <ma14:wrappingTextBoxFlag xmlns:ma14="http://schemas.microsoft.com/office/mac/drawingml/2011/main" val="1"/>
             </a:ext>
           </a:extLst>
         </p:spPr>
@@ -2970,7 +2875,7 @@
               <a:spcBef>
                 <a:spcPts val="4000"/>
               </a:spcBef>
-              <a:defRPr sz="6400" b="1" spc="6">
+              <a:defRPr b="1" spc="6" sz="6400">
                 <a:solidFill>
                   <a:srgbClr val="EC3516"/>
                 </a:solidFill>
@@ -2991,7 +2896,7 @@
               </a:spcBef>
               <a:buSzPct val="171000"/>
               <a:buChar char="•"/>
-              <a:defRPr sz="4400" spc="4">
+              <a:defRPr spc="4" sz="4400">
                 <a:solidFill>
                   <a:srgbClr val="3C3C3C"/>
                 </a:solidFill>
@@ -3037,7 +2942,7 @@
               </a:spcBef>
               <a:buSzPct val="171000"/>
               <a:buChar char="•"/>
-              <a:defRPr sz="4400" spc="4">
+              <a:defRPr spc="4" sz="4400">
                 <a:solidFill>
                   <a:srgbClr val="3C3C3C"/>
                 </a:solidFill>
@@ -3076,7 +2981,7 @@
               </a:spcBef>
               <a:buSzPct val="171000"/>
               <a:buChar char="•"/>
-              <a:defRPr sz="4400" spc="4">
+              <a:defRPr spc="4" sz="4400">
                 <a:solidFill>
                   <a:srgbClr val="3C3C3C"/>
                 </a:solidFill>
@@ -3115,7 +3020,7 @@
               </a:spcBef>
               <a:buSzPct val="171000"/>
               <a:buChar char="•"/>
-              <a:defRPr sz="4400" spc="4">
+              <a:defRPr spc="4" sz="4400">
                 <a:solidFill>
                   <a:srgbClr val="3C3C3C"/>
                 </a:solidFill>
@@ -3133,7 +3038,7 @@
               <a:t>: seamless code review for the tutorials with </a:t>
             </a:r>
             <a:r>
-              <a:rPr sz="4100" spc="4">
+              <a:rPr spc="4" sz="4100">
                 <a:solidFill>
                   <a:srgbClr val="000000"/>
                 </a:solidFill>
@@ -3155,7 +3060,7 @@
               </a:spcBef>
               <a:buSzPct val="171000"/>
               <a:buChar char="•"/>
-              <a:defRPr sz="4400" spc="4">
+              <a:defRPr spc="4" sz="4400">
                 <a:solidFill>
                   <a:srgbClr val="3C3C3C"/>
                 </a:solidFill>
@@ -3187,7 +3092,7 @@
               </a:spcBef>
               <a:buSzPct val="171000"/>
               <a:buChar char="•"/>
-              <a:defRPr sz="4400" spc="4">
+              <a:defRPr spc="4" sz="4400">
                 <a:solidFill>
                   <a:srgbClr val="3C3C3C"/>
                 </a:solidFill>
@@ -3219,7 +3124,7 @@
               </a:spcBef>
               <a:buSzPct val="171000"/>
               <a:buChar char="•"/>
-              <a:defRPr sz="4500" spc="4">
+              <a:defRPr spc="4" sz="4500">
                 <a:solidFill>
                   <a:srgbClr val="3C3C3C"/>
                 </a:solidFill>
@@ -3230,18 +3135,18 @@
               </a:defRPr>
             </a:pPr>
             <a:r>
-              <a:rPr sz="4400" u="sng" spc="4"/>
+              <a:rPr spc="4" sz="4400" u="sng"/>
               <a:t>Shipping</a:t>
             </a:r>
             <a:r>
-              <a:rPr sz="4400" spc="4"/>
+              <a:rPr spc="4" sz="4400"/>
               <a:t>:</a:t>
             </a:r>
             <a:r>
               <a:t> </a:t>
             </a:r>
             <a:r>
-              <a:rPr sz="4100" spc="4">
+              <a:rPr spc="4" sz="4100">
                 <a:solidFill>
                   <a:srgbClr val="000000"/>
                 </a:solidFill>
@@ -3250,28 +3155,41 @@
                 <a:cs typeface="Courier"/>
                 <a:sym typeface="Courier"/>
               </a:rPr>
-              <a:t>gammapy download </a:t>
-            </a:r>
-            <a:r>
-              <a:rPr sz="4400" spc="4"/>
+              <a:t>gammapy download</a:t>
+            </a:r>
+            <a:r>
+              <a:rPr spc="4" sz="4100">
+                <a:solidFill>
+                  <a:srgbClr val="000000"/>
+                </a:solidFill>
+                <a:latin typeface="Courier"/>
+                <a:ea typeface="Courier"/>
+                <a:cs typeface="Courier"/>
+                <a:sym typeface="Courier"/>
+              </a:rPr>
+              <a:t> </a:t>
+            </a:r>
+            <a:r>
+              <a:rPr spc="4" sz="4400"/>
               <a:t>command allows to retrieve versioned tutorials, composed of </a:t>
             </a:r>
             <a:r>
-              <a:rPr sz="4400" i="1" spc="4"/>
+              <a:rPr i="1" spc="4" sz="4400"/>
               <a:t>Jupyter</a:t>
             </a:r>
             <a:r>
-              <a:rPr sz="4400" spc="4"/>
+              <a:rPr spc="4" sz="4400"/>
               <a:t> notebooks, the datasets needed and the </a:t>
             </a:r>
             <a:r>
-              <a:rPr sz="4400" i="1" spc="4"/>
+              <a:rPr i="1" spc="4" sz="4400"/>
               <a:t>conda</a:t>
             </a:r>
             <a:r>
-              <a:rPr sz="4400" spc="4"/>
+              <a:rPr spc="4" sz="4400"/>
               <a:t> configuration file to build the environment.</a:t>
             </a:r>
+            <a:endParaRPr spc="4" sz="4400"/>
           </a:p>
           <a:p>
             <a:pPr marL="1741757" indent="-471757" algn="just" defTabSz="3048000">
@@ -3280,7 +3198,7 @@
               </a:spcBef>
               <a:buSzPct val="171000"/>
               <a:buChar char="•"/>
-              <a:defRPr sz="4400" spc="4">
+              <a:defRPr spc="4" sz="4400">
                 <a:solidFill>
                   <a:srgbClr val="3C3C3C"/>
                 </a:solidFill>
@@ -3303,7 +3221,7 @@
               <a:spcBef>
                 <a:spcPts val="1500"/>
               </a:spcBef>
-              <a:defRPr sz="4200" spc="4">
+              <a:defRPr spc="4" sz="4200">
                 <a:solidFill>
                   <a:srgbClr val="0096FF"/>
                 </a:solidFill>
@@ -3315,7 +3233,7 @@
             </a:pPr>
             <a:r>
               <a:rPr u="sng">
-                <a:hlinkClick r:id="rId16"/>
+                <a:hlinkClick r:id="rId16" invalidUrl="" action="" tgtFrame="" tooltip="" history="1" highlightClick="0" endSnd="0"/>
               </a:rPr>
               <a:t>https://github.com/gammapy/gammapy</a:t>
             </a:r>
@@ -3325,7 +3243,7 @@
               <a:spcBef>
                 <a:spcPts val="1500"/>
               </a:spcBef>
-              <a:defRPr sz="4200" spc="4">
+              <a:defRPr spc="4" sz="4200">
                 <a:solidFill>
                   <a:srgbClr val="0096FF"/>
                 </a:solidFill>
@@ -3337,7 +3255,7 @@
             </a:pPr>
             <a:r>
               <a:rPr u="sng">
-                <a:hlinkClick r:id="rId17"/>
+                <a:hlinkClick r:id="rId17" invalidUrl="" action="" tgtFrame="" tooltip="" history="1" highlightClick="0" endSnd="0"/>
               </a:rPr>
               <a:t>https://docs.gammapy.org</a:t>
             </a:r>
@@ -3347,7 +3265,7 @@
               <a:spcBef>
                 <a:spcPts val="1500"/>
               </a:spcBef>
-              <a:defRPr sz="4200" spc="4">
+              <a:defRPr spc="4" sz="4200">
                 <a:solidFill>
                   <a:srgbClr val="0096FF"/>
                 </a:solidFill>
@@ -3359,7 +3277,7 @@
             </a:pPr>
             <a:r>
               <a:rPr u="sng">
-                <a:hlinkClick r:id="rId18"/>
+                <a:hlinkClick r:id="rId18" invalidUrl="" action="" tgtFrame="" tooltip="" history="1" highlightClick="0" endSnd="0"/>
               </a:rPr>
               <a:t>https://gammapy.org</a:t>
             </a:r>
@@ -3385,7 +3303,7 @@
           </a:ln>
           <a:extLst>
             <a:ext uri="{C572A759-6A51-4108-AA02-DFA0A04FC94B}">
-              <ma14:wrappingTextBoxFlag xmlns:ma14="http://schemas.microsoft.com/office/mac/drawingml/2011/main" xmlns:a14="http://schemas.microsoft.com/office/drawing/2010/main" xmlns:m="http://schemas.openxmlformats.org/officeDocument/2006/math" xmlns="" val="1"/>
+              <ma14:wrappingTextBoxFlag xmlns:ma14="http://schemas.microsoft.com/office/mac/drawingml/2011/main" val="1"/>
             </a:ext>
           </a:extLst>
         </p:spPr>
@@ -3399,7 +3317,7 @@
               <a:spcBef>
                 <a:spcPts val="4000"/>
               </a:spcBef>
-              <a:defRPr sz="6400" b="1" spc="6">
+              <a:defRPr b="1" spc="6" sz="6400">
                 <a:solidFill>
                   <a:srgbClr val="EC3516"/>
                 </a:solidFill>
@@ -3418,7 +3336,7 @@
               <a:spcBef>
                 <a:spcPts val="1500"/>
               </a:spcBef>
-              <a:defRPr sz="4400" spc="4">
+              <a:defRPr spc="4" sz="4400">
                 <a:solidFill>
                   <a:srgbClr val="3C3C3C"/>
                 </a:solidFill>
@@ -3467,7 +3385,7 @@
                   <a:srgbClr val="FFFFFF"/>
                 </a:solidFill>
                 <a:effectLst>
-                  <a:outerShdw blurRad="38100" dist="12700" dir="5400000" rotWithShape="0">
+                  <a:outerShdw sx="100000" sy="100000" kx="0" ky="0" algn="b" rotWithShape="0" blurRad="38100" dist="12700" dir="5400000">
                     <a:srgbClr val="000000">
                       <a:alpha val="50000"/>
                     </a:srgbClr>
@@ -3479,7 +3397,6 @@
                 <a:sym typeface="Gill Sans"/>
               </a:defRPr>
             </a:pPr>
-            <a:endParaRPr/>
           </a:p>
         </p:txBody>
       </p:sp>
@@ -3502,7 +3419,7 @@
           </a:ln>
           <a:extLst>
             <a:ext uri="{C572A759-6A51-4108-AA02-DFA0A04FC94B}">
-              <ma14:wrappingTextBoxFlag xmlns:ma14="http://schemas.microsoft.com/office/mac/drawingml/2011/main" xmlns:a14="http://schemas.microsoft.com/office/drawing/2010/main" xmlns:m="http://schemas.openxmlformats.org/officeDocument/2006/math" xmlns="" val="1"/>
+              <ma14:wrappingTextBoxFlag xmlns:ma14="http://schemas.microsoft.com/office/mac/drawingml/2011/main" val="1"/>
             </a:ext>
           </a:extLst>
         </p:spPr>
@@ -3516,7 +3433,7 @@
               <a:spcBef>
                 <a:spcPts val="4000"/>
               </a:spcBef>
-              <a:defRPr sz="6400" b="1" spc="6">
+              <a:defRPr b="1" spc="6" sz="6400">
                 <a:solidFill>
                   <a:srgbClr val="EC3516"/>
                 </a:solidFill>
@@ -3529,7 +3446,7 @@
             <a:r>
               <a:t>Command Line Tools</a:t>
             </a:r>
-            <a:endParaRPr sz="4500" spc="4">
+            <a:endParaRPr spc="4" sz="4500">
               <a:solidFill>
                 <a:srgbClr val="7F7F7F"/>
               </a:solidFill>
@@ -3540,7 +3457,7 @@
               <a:spcBef>
                 <a:spcPts val="1500"/>
               </a:spcBef>
-              <a:defRPr sz="4500" spc="4">
+              <a:defRPr spc="4" sz="4500">
                 <a:solidFill>
                   <a:srgbClr val="3C3C3C"/>
                 </a:solidFill>
@@ -3551,7 +3468,7 @@
               </a:defRPr>
             </a:pPr>
             <a:r>
-              <a:rPr sz="4100" spc="4">
+              <a:rPr spc="4" sz="4100">
                 <a:solidFill>
                   <a:srgbClr val="000000"/>
                 </a:solidFill>
@@ -3566,19 +3483,19 @@
               <a:t> </a:t>
             </a:r>
             <a:r>
-              <a:rPr sz="4400" spc="4"/>
+              <a:rPr spc="4" sz="4400"/>
               <a:t>provides </a:t>
             </a:r>
             <a:r>
-              <a:rPr sz="4400" b="1" spc="4"/>
+              <a:rPr b="1" spc="4" sz="4400"/>
               <a:t>users</a:t>
             </a:r>
             <a:r>
-              <a:rPr sz="4400" spc="4"/>
+              <a:rPr spc="4" sz="4400"/>
               <a:t> with the means to retrieve any tutorials-related asset for a specific version, whereas </a:t>
             </a:r>
             <a:r>
-              <a:rPr sz="4100" spc="4">
+              <a:rPr spc="4" sz="4100">
                 <a:solidFill>
                   <a:srgbClr val="000000"/>
                 </a:solidFill>
@@ -3593,24 +3510,25 @@
               <a:t> </a:t>
             </a:r>
             <a:r>
-              <a:rPr sz="4400" spc="4"/>
+              <a:rPr spc="4" sz="4400"/>
               <a:t>provides </a:t>
             </a:r>
             <a:r>
-              <a:rPr sz="4400" b="1" spc="4"/>
+              <a:rPr b="1" spc="4" sz="4400"/>
               <a:t>developers</a:t>
             </a:r>
             <a:r>
-              <a:rPr sz="4400" spc="4"/>
+              <a:rPr spc="4" sz="4400"/>
               <a:t> with a tool to work with notebooks in a seamless workflow for the development/review/publish process of the versioned executable tutorials.</a:t>
             </a:r>
+            <a:endParaRPr spc="4" sz="4400"/>
           </a:p>
           <a:p>
             <a:pPr algn="just" defTabSz="3048000">
               <a:spcBef>
                 <a:spcPts val="1500"/>
               </a:spcBef>
-              <a:defRPr sz="4500" spc="4">
+              <a:defRPr spc="4" sz="4500">
                 <a:solidFill>
                   <a:srgbClr val="3C3C3C"/>
                 </a:solidFill>
@@ -3620,14 +3538,13 @@
                 <a:sym typeface="Arial"/>
               </a:defRPr>
             </a:pPr>
-            <a:endParaRPr sz="4400" spc="4"/>
           </a:p>
           <a:p>
             <a:pPr algn="just" defTabSz="3048000">
               <a:spcBef>
                 <a:spcPts val="1500"/>
               </a:spcBef>
-              <a:defRPr sz="4500" spc="4">
+              <a:defRPr spc="4" sz="4500">
                 <a:solidFill>
                   <a:srgbClr val="3C3C3C"/>
                 </a:solidFill>
@@ -3637,14 +3554,13 @@
                 <a:sym typeface="Arial"/>
               </a:defRPr>
             </a:pPr>
-            <a:endParaRPr sz="4400" spc="4"/>
           </a:p>
           <a:p>
             <a:pPr algn="just" defTabSz="3048000">
               <a:spcBef>
                 <a:spcPts val="1500"/>
               </a:spcBef>
-              <a:defRPr sz="4500" spc="4">
+              <a:defRPr spc="4" sz="4500">
                 <a:solidFill>
                   <a:srgbClr val="3C3C3C"/>
                 </a:solidFill>
@@ -3654,14 +3570,13 @@
                 <a:sym typeface="Arial"/>
               </a:defRPr>
             </a:pPr>
-            <a:endParaRPr sz="4400" spc="4"/>
           </a:p>
           <a:p>
             <a:pPr algn="just" defTabSz="3048000">
               <a:spcBef>
                 <a:spcPts val="1500"/>
               </a:spcBef>
-              <a:defRPr sz="4500" spc="4">
+              <a:defRPr spc="4" sz="4500">
                 <a:solidFill>
                   <a:srgbClr val="3C3C3C"/>
                 </a:solidFill>
@@ -3671,14 +3586,13 @@
                 <a:sym typeface="Arial"/>
               </a:defRPr>
             </a:pPr>
-            <a:endParaRPr sz="4400" spc="4"/>
           </a:p>
           <a:p>
             <a:pPr algn="just" defTabSz="3048000">
               <a:spcBef>
                 <a:spcPts val="1500"/>
               </a:spcBef>
-              <a:defRPr sz="4500" spc="4">
+              <a:defRPr spc="4" sz="4500">
                 <a:solidFill>
                   <a:srgbClr val="3C3C3C"/>
                 </a:solidFill>
@@ -3688,7 +3602,6 @@
                 <a:sym typeface="Arial"/>
               </a:defRPr>
             </a:pPr>
-            <a:endParaRPr sz="4400" spc="4"/>
           </a:p>
         </p:txBody>
       </p:sp>
@@ -4070,7 +3983,7 @@
                   <a:srgbClr val="FFFFFF"/>
                 </a:solidFill>
                 <a:effectLst>
-                  <a:outerShdw blurRad="38100" dist="12700" dir="5400000" rotWithShape="0">
+                  <a:outerShdw sx="100000" sy="100000" kx="0" ky="0" algn="b" rotWithShape="0" blurRad="38100" dist="12700" dir="5400000">
                     <a:srgbClr val="000000">
                       <a:alpha val="50000"/>
                     </a:srgbClr>
@@ -4082,7 +3995,6 @@
                 <a:sym typeface="Gill Sans"/>
               </a:defRPr>
             </a:pPr>
-            <a:endParaRPr/>
           </a:p>
         </p:txBody>
       </p:sp>
@@ -4118,7 +4030,7 @@
                   <a:srgbClr val="FFFFFF"/>
                 </a:solidFill>
                 <a:effectLst>
-                  <a:outerShdw blurRad="38100" dist="12700" dir="5400000" rotWithShape="0">
+                  <a:outerShdw sx="100000" sy="100000" kx="0" ky="0" algn="b" rotWithShape="0" blurRad="38100" dist="12700" dir="5400000">
                     <a:srgbClr val="000000">
                       <a:alpha val="50000"/>
                     </a:srgbClr>
@@ -4130,7 +4042,6 @@
                 <a:sym typeface="Gill Sans"/>
               </a:defRPr>
             </a:pPr>
-            <a:endParaRPr/>
           </a:p>
         </p:txBody>
       </p:sp>
@@ -4166,7 +4077,7 @@
                   <a:srgbClr val="FFFFFF"/>
                 </a:solidFill>
                 <a:effectLst>
-                  <a:outerShdw blurRad="38100" dist="12700" dir="5400000" rotWithShape="0">
+                  <a:outerShdw sx="100000" sy="100000" kx="0" ky="0" algn="b" rotWithShape="0" blurRad="38100" dist="12700" dir="5400000">
                     <a:srgbClr val="000000">
                       <a:alpha val="50000"/>
                     </a:srgbClr>
@@ -4178,7 +4089,6 @@
                 <a:sym typeface="Gill Sans"/>
               </a:defRPr>
             </a:pPr>
-            <a:endParaRPr/>
           </a:p>
         </p:txBody>
       </p:sp>
@@ -4229,8 +4139,8 @@
         </p:blipFill>
         <p:spPr>
           <a:xfrm>
-            <a:off x="17408179" y="24343636"/>
-            <a:ext cx="2350120" cy="1167012"/>
+            <a:off x="17648343" y="24422534"/>
+            <a:ext cx="2421918" cy="1202665"/>
           </a:xfrm>
           <a:prstGeom prst="rect">
             <a:avLst/>
@@ -4520,7 +4430,7 @@
           </a:ln>
           <a:extLst>
             <a:ext uri="{C572A759-6A51-4108-AA02-DFA0A04FC94B}">
-              <ma14:wrappingTextBoxFlag xmlns:ma14="http://schemas.microsoft.com/office/mac/drawingml/2011/main" xmlns:a14="http://schemas.microsoft.com/office/drawing/2010/main" xmlns:m="http://schemas.openxmlformats.org/officeDocument/2006/math" xmlns="" val="1"/>
+              <ma14:wrappingTextBoxFlag xmlns:ma14="http://schemas.microsoft.com/office/mac/drawingml/2011/main" val="1"/>
             </a:ext>
           </a:extLst>
         </p:spPr>
@@ -4533,7 +4443,7 @@
               <a:spcBef>
                 <a:spcPts val="1500"/>
               </a:spcBef>
-              <a:defRPr sz="2200" b="1" i="1" spc="2">
+              <a:defRPr b="1" i="1" spc="2" sz="2200">
                 <a:solidFill>
                   <a:srgbClr val="3C3C3C"/>
                 </a:solidFill>
@@ -4545,6 +4455,7 @@
             </a:lvl1pPr>
           </a:lstStyle>
           <a:p>
+            <a:pPr/>
             <a:r>
               <a:t>Lookup files</a:t>
             </a:r>
@@ -4599,7 +4510,7 @@
           </a:ln>
           <a:extLst>
             <a:ext uri="{C572A759-6A51-4108-AA02-DFA0A04FC94B}">
-              <ma14:wrappingTextBoxFlag xmlns:ma14="http://schemas.microsoft.com/office/mac/drawingml/2011/main" xmlns:a14="http://schemas.microsoft.com/office/drawing/2010/main" xmlns:m="http://schemas.openxmlformats.org/officeDocument/2006/math" xmlns="" val="1"/>
+              <ma14:wrappingTextBoxFlag xmlns:ma14="http://schemas.microsoft.com/office/mac/drawingml/2011/main" val="1"/>
             </a:ext>
           </a:extLst>
         </p:spPr>
@@ -4612,7 +4523,7 @@
               <a:spcBef>
                 <a:spcPts val="1500"/>
               </a:spcBef>
-              <a:defRPr sz="2200" b="1" i="1" spc="2">
+              <a:defRPr b="1" i="1" spc="2" sz="2200">
                 <a:solidFill>
                   <a:srgbClr val="3C3C3C"/>
                 </a:solidFill>
@@ -4624,6 +4535,7 @@
             </a:lvl1pPr>
           </a:lstStyle>
           <a:p>
+            <a:pPr/>
             <a:r>
               <a:t>Datasets</a:t>
             </a:r>
@@ -4658,7 +4570,7 @@
             <a:miter lim="400000"/>
           </a:ln>
           <a:effectLst>
-            <a:outerShdw blurRad="254000" dist="127000" dir="5400000" rotWithShape="0">
+            <a:outerShdw sx="100000" sy="100000" kx="0" ky="0" algn="b" rotWithShape="0" blurRad="254000" dist="127000" dir="5400000">
               <a:srgbClr val="000000">
                 <a:alpha val="70000"/>
               </a:srgbClr>
@@ -4685,7 +4597,7 @@
           </a:ln>
           <a:extLst>
             <a:ext uri="{C572A759-6A51-4108-AA02-DFA0A04FC94B}">
-              <ma14:wrappingTextBoxFlag xmlns:ma14="http://schemas.microsoft.com/office/mac/drawingml/2011/main" xmlns:a14="http://schemas.microsoft.com/office/drawing/2010/main" xmlns:m="http://schemas.openxmlformats.org/officeDocument/2006/math" xmlns="" val="1"/>
+              <ma14:wrappingTextBoxFlag xmlns:ma14="http://schemas.microsoft.com/office/mac/drawingml/2011/main" val="1"/>
             </a:ext>
           </a:extLst>
         </p:spPr>
@@ -4698,7 +4610,7 @@
               <a:spcBef>
                 <a:spcPts val="1500"/>
               </a:spcBef>
-              <a:defRPr sz="2400" u="sng" spc="2">
+              <a:defRPr spc="2" sz="2400" u="sng">
                 <a:solidFill>
                   <a:srgbClr val="0096FF"/>
                 </a:solidFill>
@@ -4706,7 +4618,7 @@
                 <a:ea typeface="Arial"/>
                 <a:cs typeface="Arial"/>
                 <a:sym typeface="Arial"/>
-                <a:hlinkClick r:id="rId34"/>
+                <a:hlinkClick r:id="rId34" invalidUrl="" action="" tgtFrame="" tooltip="" history="1" highlightClick="0" endSnd="0"/>
               </a:defRPr>
             </a:lvl1pPr>
           </a:lstStyle>
@@ -4716,7 +4628,7 @@
             </a:pPr>
             <a:r>
               <a:rPr u="sng">
-                <a:hlinkClick r:id="rId34"/>
+                <a:hlinkClick r:id="rId34" invalidUrl="" action="" tgtFrame="" tooltip="" history="1" highlightClick="0" endSnd="0"/>
               </a:rPr>
               <a:t>https://www.openhub.net/p/gammapy</a:t>
             </a:r>
@@ -4741,8 +4653,8 @@
         </p:blipFill>
         <p:spPr>
           <a:xfrm>
-            <a:off x="14216608" y="23541829"/>
-            <a:ext cx="2630491" cy="2630491"/>
+            <a:off x="14825072" y="23710642"/>
+            <a:ext cx="2563529" cy="2563529"/>
           </a:xfrm>
           <a:prstGeom prst="rect">
             <a:avLst/>
@@ -4771,7 +4683,7 @@
           </a:ln>
           <a:extLst>
             <a:ext uri="{C572A759-6A51-4108-AA02-DFA0A04FC94B}">
-              <ma14:wrappingTextBoxFlag xmlns:ma14="http://schemas.microsoft.com/office/mac/drawingml/2011/main" xmlns:a14="http://schemas.microsoft.com/office/drawing/2010/main" xmlns:m="http://schemas.openxmlformats.org/officeDocument/2006/math" xmlns="" val="1"/>
+              <ma14:wrappingTextBoxFlag xmlns:ma14="http://schemas.microsoft.com/office/mac/drawingml/2011/main" val="1"/>
             </a:ext>
           </a:extLst>
         </p:spPr>
@@ -4784,7 +4696,7 @@
               <a:spcBef>
                 <a:spcPts val="1500"/>
               </a:spcBef>
-              <a:defRPr sz="2600" spc="2">
+              <a:defRPr spc="2" sz="2600">
                 <a:latin typeface="Courier"/>
                 <a:ea typeface="Courier"/>
                 <a:cs typeface="Courier"/>
@@ -4838,7 +4750,7 @@
           </a:ln>
           <a:extLst>
             <a:ext uri="{C572A759-6A51-4108-AA02-DFA0A04FC94B}">
-              <ma14:wrappingTextBoxFlag xmlns:ma14="http://schemas.microsoft.com/office/mac/drawingml/2011/main" xmlns:a14="http://schemas.microsoft.com/office/drawing/2010/main" xmlns:m="http://schemas.openxmlformats.org/officeDocument/2006/math" xmlns="" val="1"/>
+              <ma14:wrappingTextBoxFlag xmlns:ma14="http://schemas.microsoft.com/office/mac/drawingml/2011/main" val="1"/>
             </a:ext>
           </a:extLst>
         </p:spPr>
@@ -4851,7 +4763,7 @@
               <a:spcBef>
                 <a:spcPts val="1500"/>
               </a:spcBef>
-              <a:defRPr sz="2600" spc="2">
+              <a:defRPr spc="2" sz="2600">
                 <a:latin typeface="Courier"/>
                 <a:ea typeface="Courier"/>
                 <a:cs typeface="Courier"/>
@@ -4934,7 +4846,7 @@
           </a:ln>
           <a:extLst>
             <a:ext uri="{C572A759-6A51-4108-AA02-DFA0A04FC94B}">
-              <ma14:wrappingTextBoxFlag xmlns:ma14="http://schemas.microsoft.com/office/mac/drawingml/2011/main" xmlns:a14="http://schemas.microsoft.com/office/drawing/2010/main" xmlns:m="http://schemas.openxmlformats.org/officeDocument/2006/math" xmlns="" val="1"/>
+              <ma14:wrappingTextBoxFlag xmlns:ma14="http://schemas.microsoft.com/office/mac/drawingml/2011/main" val="1"/>
             </a:ext>
           </a:extLst>
         </p:spPr>
@@ -4947,7 +4859,7 @@
               <a:spcBef>
                 <a:spcPts val="1500"/>
               </a:spcBef>
-              <a:defRPr sz="4400" spc="4">
+              <a:defRPr spc="4" sz="4400">
                 <a:solidFill>
                   <a:srgbClr val="3C3C3C"/>
                 </a:solidFill>
@@ -4959,6 +4871,7 @@
             </a:lvl1pPr>
           </a:lstStyle>
           <a:p>
+            <a:pPr/>
             <a:r>
               <a:t>A Python package for gamma-ray astronomy.      A prototype for the Cherenkov Telescope Array (CTA) science tools.</a:t>
             </a:r>
@@ -4984,7 +4897,7 @@
           </a:ln>
           <a:extLst>
             <a:ext uri="{C572A759-6A51-4108-AA02-DFA0A04FC94B}">
-              <ma14:wrappingTextBoxFlag xmlns:ma14="http://schemas.microsoft.com/office/mac/drawingml/2011/main" xmlns:a14="http://schemas.microsoft.com/office/drawing/2010/main" xmlns:m="http://schemas.openxmlformats.org/officeDocument/2006/math" xmlns="" val="1"/>
+              <ma14:wrappingTextBoxFlag xmlns:ma14="http://schemas.microsoft.com/office/mac/drawingml/2011/main" val="1"/>
             </a:ext>
           </a:extLst>
         </p:spPr>
@@ -4997,7 +4910,7 @@
               <a:spcBef>
                 <a:spcPts val="1500"/>
               </a:spcBef>
-              <a:defRPr sz="2600" spc="2">
+              <a:defRPr spc="2" sz="2600">
                 <a:latin typeface="Courier"/>
                 <a:ea typeface="Courier"/>
                 <a:cs typeface="Courier"/>
@@ -5051,7 +4964,7 @@
           </a:ln>
           <a:extLst>
             <a:ext uri="{C572A759-6A51-4108-AA02-DFA0A04FC94B}">
-              <ma14:wrappingTextBoxFlag xmlns:ma14="http://schemas.microsoft.com/office/mac/drawingml/2011/main" xmlns:a14="http://schemas.microsoft.com/office/drawing/2010/main" xmlns:m="http://schemas.openxmlformats.org/officeDocument/2006/math" xmlns="" val="1"/>
+              <ma14:wrappingTextBoxFlag xmlns:ma14="http://schemas.microsoft.com/office/mac/drawingml/2011/main" val="1"/>
             </a:ext>
           </a:extLst>
         </p:spPr>
@@ -5064,7 +4977,7 @@
               <a:spcBef>
                 <a:spcPts val="1500"/>
               </a:spcBef>
-              <a:defRPr sz="2600" spc="2">
+              <a:defRPr spc="2" sz="2600">
                 <a:latin typeface="Courier"/>
                 <a:ea typeface="Courier"/>
                 <a:cs typeface="Courier"/>
@@ -5118,7 +5031,7 @@
           </a:ln>
           <a:extLst>
             <a:ext uri="{C572A759-6A51-4108-AA02-DFA0A04FC94B}">
-              <ma14:wrappingTextBoxFlag xmlns:ma14="http://schemas.microsoft.com/office/mac/drawingml/2011/main" xmlns:a14="http://schemas.microsoft.com/office/drawing/2010/main" xmlns:m="http://schemas.openxmlformats.org/officeDocument/2006/math" xmlns="" val="1"/>
+              <ma14:wrappingTextBoxFlag xmlns:ma14="http://schemas.microsoft.com/office/mac/drawingml/2011/main" val="1"/>
             </a:ext>
           </a:extLst>
         </p:spPr>
@@ -5131,7 +5044,7 @@
               <a:spcBef>
                 <a:spcPts val="1500"/>
               </a:spcBef>
-              <a:defRPr sz="2600" spc="2">
+              <a:defRPr spc="2" sz="2600">
                 <a:latin typeface="Courier"/>
                 <a:ea typeface="Courier"/>
                 <a:cs typeface="Courier"/>
@@ -5195,17 +5108,46 @@
           </a:ln>
         </p:spPr>
       </p:pic>
+      <p:pic>
+        <p:nvPicPr>
+          <p:cNvPr id="100" name="logo2-readme.png" descr="logo2-readme.png"/>
+          <p:cNvPicPr>
+            <a:picLocks noChangeAspect="1"/>
+          </p:cNvPicPr>
+          <p:nvPr/>
+        </p:nvPicPr>
+        <p:blipFill>
+          <a:blip r:embed="rId37">
+            <a:extLst/>
+          </a:blip>
+          <a:stretch>
+            <a:fillRect/>
+          </a:stretch>
+        </p:blipFill>
+        <p:spPr>
+          <a:xfrm>
+            <a:off x="7765487" y="30471890"/>
+            <a:ext cx="4854900" cy="1780131"/>
+          </a:xfrm>
+          <a:prstGeom prst="rect">
+            <a:avLst/>
+          </a:prstGeom>
+          <a:ln w="12700">
+            <a:miter lim="400000"/>
+          </a:ln>
+        </p:spPr>
+      </p:pic>
     </p:spTree>
   </p:cSld>
   <p:clrMapOvr>
     <a:masterClrMapping/>
   </p:clrMapOvr>
-  <p:transition spd="med"/>
+  <p:transition xmlns:p14="http://schemas.microsoft.com/office/powerpoint/2010/main" spd="med" advClick="1"/>
 </p:sld>
 </file>
 
 <file path=ppt/theme/theme1.xml><?xml version="1.0" encoding="utf-8"?>
-<a:theme xmlns:a="http://schemas.openxmlformats.org/drawingml/2006/main" name="White">
+<a:theme xmlns:a="http://schemas.openxmlformats.org/drawingml/2006/main" xmlns:r="http://schemas.openxmlformats.org/officeDocument/2006/relationships" name="White">
   <a:themeElements>
     <a:clrScheme name="White">
       <a:dk1>
@@ -5334,7 +5276,7 @@
         </a:effectStyle>
         <a:effectStyle>
           <a:effectLst>
-            <a:outerShdw blurRad="50800" dist="12700" rotWithShape="0">
+            <a:outerShdw sx="100000" sy="100000" kx="0" ky="0" algn="b" rotWithShape="0" blurRad="50800" dist="12700" dir="0">
               <a:srgbClr val="000000">
                 <a:alpha val="50000"/>
               </a:srgbClr>
@@ -5343,7 +5285,7 @@
         </a:effectStyle>
         <a:effectStyle>
           <a:effectLst>
-            <a:outerShdw blurRad="38100" dist="25400" dir="5400000" rotWithShape="0">
+            <a:outerShdw sx="100000" sy="100000" kx="0" ky="0" algn="b" rotWithShape="0" blurRad="38100" dist="25400" dir="5400000">
               <a:srgbClr val="000000">
                 <a:alpha val="50000"/>
               </a:srgbClr>
@@ -5418,7 +5360,7 @@
         <a:effectLst/>
         <a:sp3d/>
       </a:spPr>
-      <a:bodyPr rot="0" spcFirstLastPara="1" vertOverflow="overflow" horzOverflow="overflow" vert="horz" wrap="square" lIns="190500" tIns="190500" rIns="190500" bIns="190500" numCol="1" spcCol="38100" rtlCol="0" anchor="ctr">
+      <a:bodyPr rot="0" spcFirstLastPara="1" vertOverflow="overflow" horzOverflow="overflow" vert="horz" wrap="square" lIns="190500" tIns="190500" rIns="190500" bIns="190500" numCol="1" spcCol="38100" rtlCol="0" anchor="ctr" upright="0">
         <a:spAutoFit/>
       </a:bodyPr>
       <a:lstStyle>
@@ -5437,7 +5379,7 @@
           <a:buFontTx/>
           <a:buNone/>
           <a:tabLst/>
-          <a:defRPr kumimoji="0" sz="20000" b="0" i="0" u="none" strike="noStrike" cap="none" spc="0" normalizeH="0" baseline="0">
+          <a:defRPr b="0" baseline="0" cap="none" i="0" spc="0" strike="noStrike" sz="20000" u="none" kumimoji="0" normalizeH="0">
             <a:ln>
               <a:noFill/>
             </a:ln>
@@ -5445,7 +5387,7 @@
               <a:srgbClr val="FFFFFF"/>
             </a:solidFill>
             <a:effectLst>
-              <a:outerShdw blurRad="38100" dist="12700" dir="5400000" rotWithShape="0">
+              <a:outerShdw sx="100000" sy="100000" kx="0" ky="0" algn="b" rotWithShape="0" blurRad="38100" dist="12700" dir="5400000">
                 <a:srgbClr val="000000">
                   <a:alpha val="50000"/>
                 </a:srgbClr>
@@ -5473,7 +5415,7 @@
           <a:buFontTx/>
           <a:buNone/>
           <a:tabLst/>
-          <a:defRPr kumimoji="0" sz="1800" b="0" i="0" u="none" strike="noStrike" cap="none" spc="0" normalizeH="0" baseline="0">
+          <a:defRPr b="0" baseline="0" cap="none" i="0" spc="0" strike="noStrike" sz="1800" u="none" kumimoji="0" normalizeH="0">
             <a:ln>
               <a:noFill/>
             </a:ln>
@@ -5499,7 +5441,7 @@
           <a:buFontTx/>
           <a:buNone/>
           <a:tabLst/>
-          <a:defRPr kumimoji="0" sz="1800" b="0" i="0" u="none" strike="noStrike" cap="none" spc="0" normalizeH="0" baseline="0">
+          <a:defRPr b="0" baseline="0" cap="none" i="0" spc="0" strike="noStrike" sz="1800" u="none" kumimoji="0" normalizeH="0">
             <a:ln>
               <a:noFill/>
             </a:ln>
@@ -5525,7 +5467,7 @@
           <a:buFontTx/>
           <a:buNone/>
           <a:tabLst/>
-          <a:defRPr kumimoji="0" sz="1800" b="0" i="0" u="none" strike="noStrike" cap="none" spc="0" normalizeH="0" baseline="0">
+          <a:defRPr b="0" baseline="0" cap="none" i="0" spc="0" strike="noStrike" sz="1800" u="none" kumimoji="0" normalizeH="0">
             <a:ln>
               <a:noFill/>
             </a:ln>
@@ -5551,7 +5493,7 @@
           <a:buFontTx/>
           <a:buNone/>
           <a:tabLst/>
-          <a:defRPr kumimoji="0" sz="1800" b="0" i="0" u="none" strike="noStrike" cap="none" spc="0" normalizeH="0" baseline="0">
+          <a:defRPr b="0" baseline="0" cap="none" i="0" spc="0" strike="noStrike" sz="1800" u="none" kumimoji="0" normalizeH="0">
             <a:ln>
               <a:noFill/>
             </a:ln>
@@ -5577,7 +5519,7 @@
           <a:buFontTx/>
           <a:buNone/>
           <a:tabLst/>
-          <a:defRPr kumimoji="0" sz="1800" b="0" i="0" u="none" strike="noStrike" cap="none" spc="0" normalizeH="0" baseline="0">
+          <a:defRPr b="0" baseline="0" cap="none" i="0" spc="0" strike="noStrike" sz="1800" u="none" kumimoji="0" normalizeH="0">
             <a:ln>
               <a:noFill/>
             </a:ln>
@@ -5603,7 +5545,7 @@
           <a:buFontTx/>
           <a:buNone/>
           <a:tabLst/>
-          <a:defRPr kumimoji="0" sz="1800" b="0" i="0" u="none" strike="noStrike" cap="none" spc="0" normalizeH="0" baseline="0">
+          <a:defRPr b="0" baseline="0" cap="none" i="0" spc="0" strike="noStrike" sz="1800" u="none" kumimoji="0" normalizeH="0">
             <a:ln>
               <a:noFill/>
             </a:ln>
@@ -5629,7 +5571,7 @@
           <a:buFontTx/>
           <a:buNone/>
           <a:tabLst/>
-          <a:defRPr kumimoji="0" sz="1800" b="0" i="0" u="none" strike="noStrike" cap="none" spc="0" normalizeH="0" baseline="0">
+          <a:defRPr b="0" baseline="0" cap="none" i="0" spc="0" strike="noStrike" sz="1800" u="none" kumimoji="0" normalizeH="0">
             <a:ln>
               <a:noFill/>
             </a:ln>
@@ -5655,7 +5597,7 @@
           <a:buFontTx/>
           <a:buNone/>
           <a:tabLst/>
-          <a:defRPr kumimoji="0" sz="1800" b="0" i="0" u="none" strike="noStrike" cap="none" spc="0" normalizeH="0" baseline="0">
+          <a:defRPr b="0" baseline="0" cap="none" i="0" spc="0" strike="noStrike" sz="1800" u="none" kumimoji="0" normalizeH="0">
             <a:ln>
               <a:noFill/>
             </a:ln>
@@ -5681,7 +5623,7 @@
           <a:buFontTx/>
           <a:buNone/>
           <a:tabLst/>
-          <a:defRPr kumimoji="0" sz="1800" b="0" i="0" u="none" strike="noStrike" cap="none" spc="0" normalizeH="0" baseline="0">
+          <a:defRPr b="0" baseline="0" cap="none" i="0" spc="0" strike="noStrike" sz="1800" u="none" kumimoji="0" normalizeH="0">
             <a:ln>
               <a:noFill/>
             </a:ln>
@@ -5694,15 +5636,9 @@
         </a:lvl9pPr>
       </a:lstStyle>
       <a:style>
-        <a:lnRef idx="0">
-          <a:scrgbClr r="0" g="0" b="0"/>
-        </a:lnRef>
-        <a:fillRef idx="0">
-          <a:scrgbClr r="0" g="0" b="0"/>
-        </a:fillRef>
-        <a:effectRef idx="0">
-          <a:scrgbClr r="0" g="0" b="0"/>
-        </a:effectRef>
+        <a:lnRef idx="0"/>
+        <a:fillRef idx="0"/>
+        <a:effectRef idx="0"/>
         <a:fontRef idx="none"/>
       </a:style>
     </a:spDef>
@@ -5719,7 +5655,7 @@
         <a:effectLst/>
         <a:sp3d/>
       </a:spPr>
-      <a:bodyPr rot="0" spcFirstLastPara="1" vertOverflow="overflow" horzOverflow="overflow" vert="horz" wrap="square" lIns="91439" tIns="45719" rIns="91439" bIns="45719" numCol="1" spcCol="38100" rtlCol="0" anchor="t">
+      <a:bodyPr rot="0" spcFirstLastPara="1" vertOverflow="overflow" horzOverflow="overflow" vert="horz" wrap="square" lIns="91439" tIns="45719" rIns="91439" bIns="45719" numCol="1" spcCol="38100" rtlCol="0" anchor="t" upright="0">
         <a:noAutofit/>
       </a:bodyPr>
       <a:lstStyle>
@@ -5738,7 +5674,7 @@
           <a:buFontTx/>
           <a:buNone/>
           <a:tabLst/>
-          <a:defRPr kumimoji="0" sz="1800" b="0" i="0" u="none" strike="noStrike" cap="none" spc="0" normalizeH="0" baseline="0">
+          <a:defRPr b="0" baseline="0" cap="none" i="0" spc="0" strike="noStrike" sz="1800" u="none" kumimoji="0" normalizeH="0">
             <a:ln>
               <a:noFill/>
             </a:ln>
@@ -5764,7 +5700,7 @@
           <a:buFontTx/>
           <a:buNone/>
           <a:tabLst/>
-          <a:defRPr kumimoji="0" sz="1800" b="0" i="0" u="none" strike="noStrike" cap="none" spc="0" normalizeH="0" baseline="0">
+          <a:defRPr b="0" baseline="0" cap="none" i="0" spc="0" strike="noStrike" sz="1800" u="none" kumimoji="0" normalizeH="0">
             <a:ln>
               <a:noFill/>
             </a:ln>
@@ -5790,7 +5726,7 @@
           <a:buFontTx/>
           <a:buNone/>
           <a:tabLst/>
-          <a:defRPr kumimoji="0" sz="1800" b="0" i="0" u="none" strike="noStrike" cap="none" spc="0" normalizeH="0" baseline="0">
+          <a:defRPr b="0" baseline="0" cap="none" i="0" spc="0" strike="noStrike" sz="1800" u="none" kumimoji="0" normalizeH="0">
             <a:ln>
               <a:noFill/>
             </a:ln>
@@ -5816,7 +5752,7 @@
           <a:buFontTx/>
           <a:buNone/>
           <a:tabLst/>
-          <a:defRPr kumimoji="0" sz="1800" b="0" i="0" u="none" strike="noStrike" cap="none" spc="0" normalizeH="0" baseline="0">
+          <a:defRPr b="0" baseline="0" cap="none" i="0" spc="0" strike="noStrike" sz="1800" u="none" kumimoji="0" normalizeH="0">
             <a:ln>
               <a:noFill/>
             </a:ln>
@@ -5842,7 +5778,7 @@
           <a:buFontTx/>
           <a:buNone/>
           <a:tabLst/>
-          <a:defRPr kumimoji="0" sz="1800" b="0" i="0" u="none" strike="noStrike" cap="none" spc="0" normalizeH="0" baseline="0">
+          <a:defRPr b="0" baseline="0" cap="none" i="0" spc="0" strike="noStrike" sz="1800" u="none" kumimoji="0" normalizeH="0">
             <a:ln>
               <a:noFill/>
             </a:ln>
@@ -5868,7 +5804,7 @@
           <a:buFontTx/>
           <a:buNone/>
           <a:tabLst/>
-          <a:defRPr kumimoji="0" sz="1800" b="0" i="0" u="none" strike="noStrike" cap="none" spc="0" normalizeH="0" baseline="0">
+          <a:defRPr b="0" baseline="0" cap="none" i="0" spc="0" strike="noStrike" sz="1800" u="none" kumimoji="0" normalizeH="0">
             <a:ln>
               <a:noFill/>
             </a:ln>
@@ -5894,7 +5830,7 @@
           <a:buFontTx/>
           <a:buNone/>
           <a:tabLst/>
-          <a:defRPr kumimoji="0" sz="1800" b="0" i="0" u="none" strike="noStrike" cap="none" spc="0" normalizeH="0" baseline="0">
+          <a:defRPr b="0" baseline="0" cap="none" i="0" spc="0" strike="noStrike" sz="1800" u="none" kumimoji="0" normalizeH="0">
             <a:ln>
               <a:noFill/>
             </a:ln>
@@ -5920,7 +5856,7 @@
           <a:buFontTx/>
           <a:buNone/>
           <a:tabLst/>
-          <a:defRPr kumimoji="0" sz="1800" b="0" i="0" u="none" strike="noStrike" cap="none" spc="0" normalizeH="0" baseline="0">
+          <a:defRPr b="0" baseline="0" cap="none" i="0" spc="0" strike="noStrike" sz="1800" u="none" kumimoji="0" normalizeH="0">
             <a:ln>
               <a:noFill/>
             </a:ln>
@@ -5946,7 +5882,7 @@
           <a:buFontTx/>
           <a:buNone/>
           <a:tabLst/>
-          <a:defRPr kumimoji="0" sz="1800" b="0" i="0" u="none" strike="noStrike" cap="none" spc="0" normalizeH="0" baseline="0">
+          <a:defRPr b="0" baseline="0" cap="none" i="0" spc="0" strike="noStrike" sz="1800" u="none" kumimoji="0" normalizeH="0">
             <a:ln>
               <a:noFill/>
             </a:ln>
@@ -5972,7 +5908,7 @@
           <a:buFontTx/>
           <a:buNone/>
           <a:tabLst/>
-          <a:defRPr kumimoji="0" sz="1800" b="0" i="0" u="none" strike="noStrike" cap="none" spc="0" normalizeH="0" baseline="0">
+          <a:defRPr b="0" baseline="0" cap="none" i="0" spc="0" strike="noStrike" sz="1800" u="none" kumimoji="0" normalizeH="0">
             <a:ln>
               <a:noFill/>
             </a:ln>
@@ -5985,15 +5921,9 @@
         </a:lvl9pPr>
       </a:lstStyle>
       <a:style>
-        <a:lnRef idx="0">
-          <a:scrgbClr r="0" g="0" b="0"/>
-        </a:lnRef>
-        <a:fillRef idx="0">
-          <a:scrgbClr r="0" g="0" b="0"/>
-        </a:fillRef>
-        <a:effectRef idx="0">
-          <a:scrgbClr r="0" g="0" b="0"/>
-        </a:effectRef>
+        <a:lnRef idx="0"/>
+        <a:fillRef idx="0"/>
+        <a:effectRef idx="0"/>
         <a:fontRef idx="none"/>
       </a:style>
     </a:lnDef>
@@ -6007,7 +5937,7 @@
         <a:effectLst/>
         <a:sp3d/>
       </a:spPr>
-      <a:bodyPr rot="0" spcFirstLastPara="1" vertOverflow="overflow" horzOverflow="overflow" vert="horz" wrap="square" lIns="50800" tIns="50800" rIns="50800" bIns="50800" numCol="1" spcCol="38100" rtlCol="0" anchor="ctr">
+      <a:bodyPr rot="0" spcFirstLastPara="1" vertOverflow="overflow" horzOverflow="overflow" vert="horz" wrap="square" lIns="50800" tIns="50800" rIns="50800" bIns="50800" numCol="1" spcCol="38100" rtlCol="0" anchor="ctr" upright="0">
         <a:spAutoFit/>
       </a:bodyPr>
       <a:lstStyle>
@@ -6026,7 +5956,7 @@
           <a:buFontTx/>
           <a:buNone/>
           <a:tabLst/>
-          <a:defRPr kumimoji="0" sz="1200" b="0" i="0" u="none" strike="noStrike" cap="none" spc="0" normalizeH="0" baseline="0">
+          <a:defRPr b="0" baseline="0" cap="none" i="0" spc="0" strike="noStrike" sz="1200" u="none" kumimoji="0" normalizeH="0">
             <a:ln>
               <a:noFill/>
             </a:ln>
@@ -6056,7 +5986,7 @@
           <a:buFontTx/>
           <a:buNone/>
           <a:tabLst/>
-          <a:defRPr kumimoji="0" sz="1800" b="0" i="0" u="none" strike="noStrike" cap="none" spc="0" normalizeH="0" baseline="0">
+          <a:defRPr b="0" baseline="0" cap="none" i="0" spc="0" strike="noStrike" sz="1800" u="none" kumimoji="0" normalizeH="0">
             <a:ln>
               <a:noFill/>
             </a:ln>
@@ -6082,7 +6012,7 @@
           <a:buFontTx/>
           <a:buNone/>
           <a:tabLst/>
-          <a:defRPr kumimoji="0" sz="1800" b="0" i="0" u="none" strike="noStrike" cap="none" spc="0" normalizeH="0" baseline="0">
+          <a:defRPr b="0" baseline="0" cap="none" i="0" spc="0" strike="noStrike" sz="1800" u="none" kumimoji="0" normalizeH="0">
             <a:ln>
               <a:noFill/>
             </a:ln>
@@ -6108,7 +6038,7 @@
           <a:buFontTx/>
           <a:buNone/>
           <a:tabLst/>
-          <a:defRPr kumimoji="0" sz="1800" b="0" i="0" u="none" strike="noStrike" cap="none" spc="0" normalizeH="0" baseline="0">
+          <a:defRPr b="0" baseline="0" cap="none" i="0" spc="0" strike="noStrike" sz="1800" u="none" kumimoji="0" normalizeH="0">
             <a:ln>
               <a:noFill/>
             </a:ln>
@@ -6134,7 +6064,7 @@
           <a:buFontTx/>
           <a:buNone/>
           <a:tabLst/>
-          <a:defRPr kumimoji="0" sz="1800" b="0" i="0" u="none" strike="noStrike" cap="none" spc="0" normalizeH="0" baseline="0">
+          <a:defRPr b="0" baseline="0" cap="none" i="0" spc="0" strike="noStrike" sz="1800" u="none" kumimoji="0" normalizeH="0">
             <a:ln>
               <a:noFill/>
             </a:ln>
@@ -6160,7 +6090,7 @@
           <a:buFontTx/>
           <a:buNone/>
           <a:tabLst/>
-          <a:defRPr kumimoji="0" sz="1800" b="0" i="0" u="none" strike="noStrike" cap="none" spc="0" normalizeH="0" baseline="0">
+          <a:defRPr b="0" baseline="0" cap="none" i="0" spc="0" strike="noStrike" sz="1800" u="none" kumimoji="0" normalizeH="0">
             <a:ln>
               <a:noFill/>
             </a:ln>
@@ -6186,7 +6116,7 @@
           <a:buFontTx/>
           <a:buNone/>
           <a:tabLst/>
-          <a:defRPr kumimoji="0" sz="1800" b="0" i="0" u="none" strike="noStrike" cap="none" spc="0" normalizeH="0" baseline="0">
+          <a:defRPr b="0" baseline="0" cap="none" i="0" spc="0" strike="noStrike" sz="1800" u="none" kumimoji="0" normalizeH="0">
             <a:ln>
               <a:noFill/>
             </a:ln>
@@ -6212,7 +6142,7 @@
           <a:buFontTx/>
           <a:buNone/>
           <a:tabLst/>
-          <a:defRPr kumimoji="0" sz="1800" b="0" i="0" u="none" strike="noStrike" cap="none" spc="0" normalizeH="0" baseline="0">
+          <a:defRPr b="0" baseline="0" cap="none" i="0" spc="0" strike="noStrike" sz="1800" u="none" kumimoji="0" normalizeH="0">
             <a:ln>
               <a:noFill/>
             </a:ln>
@@ -6238,7 +6168,7 @@
           <a:buFontTx/>
           <a:buNone/>
           <a:tabLst/>
-          <a:defRPr kumimoji="0" sz="1800" b="0" i="0" u="none" strike="noStrike" cap="none" spc="0" normalizeH="0" baseline="0">
+          <a:defRPr b="0" baseline="0" cap="none" i="0" spc="0" strike="noStrike" sz="1800" u="none" kumimoji="0" normalizeH="0">
             <a:ln>
               <a:noFill/>
             </a:ln>
@@ -6264,7 +6194,7 @@
           <a:buFontTx/>
           <a:buNone/>
           <a:tabLst/>
-          <a:defRPr kumimoji="0" sz="1800" b="0" i="0" u="none" strike="noStrike" cap="none" spc="0" normalizeH="0" baseline="0">
+          <a:defRPr b="0" baseline="0" cap="none" i="0" spc="0" strike="noStrike" sz="1800" u="none" kumimoji="0" normalizeH="0">
             <a:ln>
               <a:noFill/>
             </a:ln>
@@ -6277,25 +6207,18 @@
         </a:lvl9pPr>
       </a:lstStyle>
       <a:style>
-        <a:lnRef idx="0">
-          <a:scrgbClr r="0" g="0" b="0"/>
-        </a:lnRef>
-        <a:fillRef idx="0">
-          <a:scrgbClr r="0" g="0" b="0"/>
-        </a:fillRef>
-        <a:effectRef idx="0">
-          <a:scrgbClr r="0" g="0" b="0"/>
-        </a:effectRef>
+        <a:lnRef idx="0"/>
+        <a:fillRef idx="0"/>
+        <a:effectRef idx="0"/>
         <a:fontRef idx="none"/>
       </a:style>
     </a:txDef>
   </a:objectDefaults>
-  <a:extraClrSchemeLst/>
 </a:theme>
 </file>
 
 <file path=ppt/theme/theme2.xml><?xml version="1.0" encoding="utf-8"?>
-<a:theme xmlns:a="http://schemas.openxmlformats.org/drawingml/2006/main" name="White">
+<a:theme xmlns:a="http://schemas.openxmlformats.org/drawingml/2006/main" xmlns:r="http://schemas.openxmlformats.org/officeDocument/2006/relationships" name="White">
   <a:themeElements>
     <a:clrScheme name="White">
       <a:dk1>
@@ -6424,7 +6347,7 @@
         </a:effectStyle>
         <a:effectStyle>
           <a:effectLst>
-            <a:outerShdw blurRad="50800" dist="12700" rotWithShape="0">
+            <a:outerShdw sx="100000" sy="100000" kx="0" ky="0" algn="b" rotWithShape="0" blurRad="50800" dist="12700" dir="0">
               <a:srgbClr val="000000">
                 <a:alpha val="50000"/>
               </a:srgbClr>
@@ -6433,7 +6356,7 @@
         </a:effectStyle>
         <a:effectStyle>
           <a:effectLst>
-            <a:outerShdw blurRad="38100" dist="25400" dir="5400000" rotWithShape="0">
+            <a:outerShdw sx="100000" sy="100000" kx="0" ky="0" algn="b" rotWithShape="0" blurRad="38100" dist="25400" dir="5400000">
               <a:srgbClr val="000000">
                 <a:alpha val="50000"/>
               </a:srgbClr>
@@ -6508,7 +6431,7 @@
         <a:effectLst/>
         <a:sp3d/>
       </a:spPr>
-      <a:bodyPr rot="0" spcFirstLastPara="1" vertOverflow="overflow" horzOverflow="overflow" vert="horz" wrap="square" lIns="190500" tIns="190500" rIns="190500" bIns="190500" numCol="1" spcCol="38100" rtlCol="0" anchor="ctr">
+      <a:bodyPr rot="0" spcFirstLastPara="1" vertOverflow="overflow" horzOverflow="overflow" vert="horz" wrap="square" lIns="190500" tIns="190500" rIns="190500" bIns="190500" numCol="1" spcCol="38100" rtlCol="0" anchor="ctr" upright="0">
         <a:spAutoFit/>
       </a:bodyPr>
       <a:lstStyle>
@@ -6527,7 +6450,7 @@
           <a:buFontTx/>
           <a:buNone/>
           <a:tabLst/>
-          <a:defRPr kumimoji="0" sz="20000" b="0" i="0" u="none" strike="noStrike" cap="none" spc="0" normalizeH="0" baseline="0">
+          <a:defRPr b="0" baseline="0" cap="none" i="0" spc="0" strike="noStrike" sz="20000" u="none" kumimoji="0" normalizeH="0">
             <a:ln>
               <a:noFill/>
             </a:ln>
@@ -6535,7 +6458,7 @@
               <a:srgbClr val="FFFFFF"/>
             </a:solidFill>
             <a:effectLst>
-              <a:outerShdw blurRad="38100" dist="12700" dir="5400000" rotWithShape="0">
+              <a:outerShdw sx="100000" sy="100000" kx="0" ky="0" algn="b" rotWithShape="0" blurRad="38100" dist="12700" dir="5400000">
                 <a:srgbClr val="000000">
                   <a:alpha val="50000"/>
                 </a:srgbClr>
@@ -6563,7 +6486,7 @@
           <a:buFontTx/>
           <a:buNone/>
           <a:tabLst/>
-          <a:defRPr kumimoji="0" sz="1800" b="0" i="0" u="none" strike="noStrike" cap="none" spc="0" normalizeH="0" baseline="0">
+          <a:defRPr b="0" baseline="0" cap="none" i="0" spc="0" strike="noStrike" sz="1800" u="none" kumimoji="0" normalizeH="0">
             <a:ln>
               <a:noFill/>
             </a:ln>
@@ -6589,7 +6512,7 @@
           <a:buFontTx/>
           <a:buNone/>
           <a:tabLst/>
-          <a:defRPr kumimoji="0" sz="1800" b="0" i="0" u="none" strike="noStrike" cap="none" spc="0" normalizeH="0" baseline="0">
+          <a:defRPr b="0" baseline="0" cap="none" i="0" spc="0" strike="noStrike" sz="1800" u="none" kumimoji="0" normalizeH="0">
             <a:ln>
               <a:noFill/>
             </a:ln>
@@ -6615,7 +6538,7 @@
           <a:buFontTx/>
           <a:buNone/>
           <a:tabLst/>
-          <a:defRPr kumimoji="0" sz="1800" b="0" i="0" u="none" strike="noStrike" cap="none" spc="0" normalizeH="0" baseline="0">
+          <a:defRPr b="0" baseline="0" cap="none" i="0" spc="0" strike="noStrike" sz="1800" u="none" kumimoji="0" normalizeH="0">
             <a:ln>
               <a:noFill/>
             </a:ln>
@@ -6641,7 +6564,7 @@
           <a:buFontTx/>
           <a:buNone/>
           <a:tabLst/>
-          <a:defRPr kumimoji="0" sz="1800" b="0" i="0" u="none" strike="noStrike" cap="none" spc="0" normalizeH="0" baseline="0">
+          <a:defRPr b="0" baseline="0" cap="none" i="0" spc="0" strike="noStrike" sz="1800" u="none" kumimoji="0" normalizeH="0">
             <a:ln>
               <a:noFill/>
             </a:ln>
@@ -6667,7 +6590,7 @@
           <a:buFontTx/>
           <a:buNone/>
           <a:tabLst/>
-          <a:defRPr kumimoji="0" sz="1800" b="0" i="0" u="none" strike="noStrike" cap="none" spc="0" normalizeH="0" baseline="0">
+          <a:defRPr b="0" baseline="0" cap="none" i="0" spc="0" strike="noStrike" sz="1800" u="none" kumimoji="0" normalizeH="0">
             <a:ln>
               <a:noFill/>
             </a:ln>
@@ -6693,7 +6616,7 @@
           <a:buFontTx/>
           <a:buNone/>
           <a:tabLst/>
-          <a:defRPr kumimoji="0" sz="1800" b="0" i="0" u="none" strike="noStrike" cap="none" spc="0" normalizeH="0" baseline="0">
+          <a:defRPr b="0" baseline="0" cap="none" i="0" spc="0" strike="noStrike" sz="1800" u="none" kumimoji="0" normalizeH="0">
             <a:ln>
               <a:noFill/>
             </a:ln>
@@ -6719,7 +6642,7 @@
           <a:buFontTx/>
           <a:buNone/>
           <a:tabLst/>
-          <a:defRPr kumimoji="0" sz="1800" b="0" i="0" u="none" strike="noStrike" cap="none" spc="0" normalizeH="0" baseline="0">
+          <a:defRPr b="0" baseline="0" cap="none" i="0" spc="0" strike="noStrike" sz="1800" u="none" kumimoji="0" normalizeH="0">
             <a:ln>
               <a:noFill/>
             </a:ln>
@@ -6745,7 +6668,7 @@
           <a:buFontTx/>
           <a:buNone/>
           <a:tabLst/>
-          <a:defRPr kumimoji="0" sz="1800" b="0" i="0" u="none" strike="noStrike" cap="none" spc="0" normalizeH="0" baseline="0">
+          <a:defRPr b="0" baseline="0" cap="none" i="0" spc="0" strike="noStrike" sz="1800" u="none" kumimoji="0" normalizeH="0">
             <a:ln>
               <a:noFill/>
             </a:ln>
@@ -6771,7 +6694,7 @@
           <a:buFontTx/>
           <a:buNone/>
           <a:tabLst/>
-          <a:defRPr kumimoji="0" sz="1800" b="0" i="0" u="none" strike="noStrike" cap="none" spc="0" normalizeH="0" baseline="0">
+          <a:defRPr b="0" baseline="0" cap="none" i="0" spc="0" strike="noStrike" sz="1800" u="none" kumimoji="0" normalizeH="0">
             <a:ln>
               <a:noFill/>
             </a:ln>
@@ -6784,15 +6707,9 @@
         </a:lvl9pPr>
       </a:lstStyle>
       <a:style>
-        <a:lnRef idx="0">
-          <a:scrgbClr r="0" g="0" b="0"/>
-        </a:lnRef>
-        <a:fillRef idx="0">
-          <a:scrgbClr r="0" g="0" b="0"/>
-        </a:fillRef>
-        <a:effectRef idx="0">
-          <a:scrgbClr r="0" g="0" b="0"/>
-        </a:effectRef>
+        <a:lnRef idx="0"/>
+        <a:fillRef idx="0"/>
+        <a:effectRef idx="0"/>
         <a:fontRef idx="none"/>
       </a:style>
     </a:spDef>
@@ -6809,7 +6726,7 @@
         <a:effectLst/>
         <a:sp3d/>
       </a:spPr>
-      <a:bodyPr rot="0" spcFirstLastPara="1" vertOverflow="overflow" horzOverflow="overflow" vert="horz" wrap="square" lIns="91439" tIns="45719" rIns="91439" bIns="45719" numCol="1" spcCol="38100" rtlCol="0" anchor="t">
+      <a:bodyPr rot="0" spcFirstLastPara="1" vertOverflow="overflow" horzOverflow="overflow" vert="horz" wrap="square" lIns="91439" tIns="45719" rIns="91439" bIns="45719" numCol="1" spcCol="38100" rtlCol="0" anchor="t" upright="0">
         <a:noAutofit/>
       </a:bodyPr>
       <a:lstStyle>
@@ -6828,7 +6745,7 @@
           <a:buFontTx/>
           <a:buNone/>
           <a:tabLst/>
-          <a:defRPr kumimoji="0" sz="1800" b="0" i="0" u="none" strike="noStrike" cap="none" spc="0" normalizeH="0" baseline="0">
+          <a:defRPr b="0" baseline="0" cap="none" i="0" spc="0" strike="noStrike" sz="1800" u="none" kumimoji="0" normalizeH="0">
             <a:ln>
               <a:noFill/>
             </a:ln>
@@ -6854,7 +6771,7 @@
           <a:buFontTx/>
           <a:buNone/>
           <a:tabLst/>
-          <a:defRPr kumimoji="0" sz="1800" b="0" i="0" u="none" strike="noStrike" cap="none" spc="0" normalizeH="0" baseline="0">
+          <a:defRPr b="0" baseline="0" cap="none" i="0" spc="0" strike="noStrike" sz="1800" u="none" kumimoji="0" normalizeH="0">
             <a:ln>
               <a:noFill/>
             </a:ln>
@@ -6880,7 +6797,7 @@
           <a:buFontTx/>
           <a:buNone/>
           <a:tabLst/>
-          <a:defRPr kumimoji="0" sz="1800" b="0" i="0" u="none" strike="noStrike" cap="none" spc="0" normalizeH="0" baseline="0">
+          <a:defRPr b="0" baseline="0" cap="none" i="0" spc="0" strike="noStrike" sz="1800" u="none" kumimoji="0" normalizeH="0">
             <a:ln>
               <a:noFill/>
             </a:ln>
@@ -6906,7 +6823,7 @@
           <a:buFontTx/>
           <a:buNone/>
           <a:tabLst/>
-          <a:defRPr kumimoji="0" sz="1800" b="0" i="0" u="none" strike="noStrike" cap="none" spc="0" normalizeH="0" baseline="0">
+          <a:defRPr b="0" baseline="0" cap="none" i="0" spc="0" strike="noStrike" sz="1800" u="none" kumimoji="0" normalizeH="0">
             <a:ln>
               <a:noFill/>
             </a:ln>
@@ -6932,7 +6849,7 @@
           <a:buFontTx/>
           <a:buNone/>
           <a:tabLst/>
-          <a:defRPr kumimoji="0" sz="1800" b="0" i="0" u="none" strike="noStrike" cap="none" spc="0" normalizeH="0" baseline="0">
+          <a:defRPr b="0" baseline="0" cap="none" i="0" spc="0" strike="noStrike" sz="1800" u="none" kumimoji="0" normalizeH="0">
             <a:ln>
               <a:noFill/>
             </a:ln>
@@ -6958,7 +6875,7 @@
           <a:buFontTx/>
           <a:buNone/>
           <a:tabLst/>
-          <a:defRPr kumimoji="0" sz="1800" b="0" i="0" u="none" strike="noStrike" cap="none" spc="0" normalizeH="0" baseline="0">
+          <a:defRPr b="0" baseline="0" cap="none" i="0" spc="0" strike="noStrike" sz="1800" u="none" kumimoji="0" normalizeH="0">
             <a:ln>
               <a:noFill/>
             </a:ln>
@@ -6984,7 +6901,7 @@
           <a:buFontTx/>
           <a:buNone/>
           <a:tabLst/>
-          <a:defRPr kumimoji="0" sz="1800" b="0" i="0" u="none" strike="noStrike" cap="none" spc="0" normalizeH="0" baseline="0">
+          <a:defRPr b="0" baseline="0" cap="none" i="0" spc="0" strike="noStrike" sz="1800" u="none" kumimoji="0" normalizeH="0">
             <a:ln>
               <a:noFill/>
             </a:ln>
@@ -7010,7 +6927,7 @@
           <a:buFontTx/>
           <a:buNone/>
           <a:tabLst/>
-          <a:defRPr kumimoji="0" sz="1800" b="0" i="0" u="none" strike="noStrike" cap="none" spc="0" normalizeH="0" baseline="0">
+          <a:defRPr b="0" baseline="0" cap="none" i="0" spc="0" strike="noStrike" sz="1800" u="none" kumimoji="0" normalizeH="0">
             <a:ln>
               <a:noFill/>
             </a:ln>
@@ -7036,7 +6953,7 @@
           <a:buFontTx/>
           <a:buNone/>
           <a:tabLst/>
-          <a:defRPr kumimoji="0" sz="1800" b="0" i="0" u="none" strike="noStrike" cap="none" spc="0" normalizeH="0" baseline="0">
+          <a:defRPr b="0" baseline="0" cap="none" i="0" spc="0" strike="noStrike" sz="1800" u="none" kumimoji="0" normalizeH="0">
             <a:ln>
               <a:noFill/>
             </a:ln>
@@ -7062,7 +6979,7 @@
           <a:buFontTx/>
           <a:buNone/>
           <a:tabLst/>
-          <a:defRPr kumimoji="0" sz="1800" b="0" i="0" u="none" strike="noStrike" cap="none" spc="0" normalizeH="0" baseline="0">
+          <a:defRPr b="0" baseline="0" cap="none" i="0" spc="0" strike="noStrike" sz="1800" u="none" kumimoji="0" normalizeH="0">
             <a:ln>
               <a:noFill/>
             </a:ln>
@@ -7075,15 +6992,9 @@
         </a:lvl9pPr>
       </a:lstStyle>
       <a:style>
-        <a:lnRef idx="0">
-          <a:scrgbClr r="0" g="0" b="0"/>
-        </a:lnRef>
-        <a:fillRef idx="0">
-          <a:scrgbClr r="0" g="0" b="0"/>
-        </a:fillRef>
-        <a:effectRef idx="0">
-          <a:scrgbClr r="0" g="0" b="0"/>
-        </a:effectRef>
+        <a:lnRef idx="0"/>
+        <a:fillRef idx="0"/>
+        <a:effectRef idx="0"/>
         <a:fontRef idx="none"/>
       </a:style>
     </a:lnDef>
@@ -7097,7 +7008,7 @@
         <a:effectLst/>
         <a:sp3d/>
       </a:spPr>
-      <a:bodyPr rot="0" spcFirstLastPara="1" vertOverflow="overflow" horzOverflow="overflow" vert="horz" wrap="square" lIns="50800" tIns="50800" rIns="50800" bIns="50800" numCol="1" spcCol="38100" rtlCol="0" anchor="ctr">
+      <a:bodyPr rot="0" spcFirstLastPara="1" vertOverflow="overflow" horzOverflow="overflow" vert="horz" wrap="square" lIns="50800" tIns="50800" rIns="50800" bIns="50800" numCol="1" spcCol="38100" rtlCol="0" anchor="ctr" upright="0">
         <a:spAutoFit/>
       </a:bodyPr>
       <a:lstStyle>
@@ -7116,7 +7027,7 @@
           <a:buFontTx/>
           <a:buNone/>
           <a:tabLst/>
-          <a:defRPr kumimoji="0" sz="1200" b="0" i="0" u="none" strike="noStrike" cap="none" spc="0" normalizeH="0" baseline="0">
+          <a:defRPr b="0" baseline="0" cap="none" i="0" spc="0" strike="noStrike" sz="1200" u="none" kumimoji="0" normalizeH="0">
             <a:ln>
               <a:noFill/>
             </a:ln>
@@ -7146,7 +7057,7 @@
           <a:buFontTx/>
           <a:buNone/>
           <a:tabLst/>
-          <a:defRPr kumimoji="0" sz="1800" b="0" i="0" u="none" strike="noStrike" cap="none" spc="0" normalizeH="0" baseline="0">
+          <a:defRPr b="0" baseline="0" cap="none" i="0" spc="0" strike="noStrike" sz="1800" u="none" kumimoji="0" normalizeH="0">
             <a:ln>
               <a:noFill/>
             </a:ln>
@@ -7172,7 +7083,7 @@
           <a:buFontTx/>
           <a:buNone/>
           <a:tabLst/>
-          <a:defRPr kumimoji="0" sz="1800" b="0" i="0" u="none" strike="noStrike" cap="none" spc="0" normalizeH="0" baseline="0">
+          <a:defRPr b="0" baseline="0" cap="none" i="0" spc="0" strike="noStrike" sz="1800" u="none" kumimoji="0" normalizeH="0">
             <a:ln>
               <a:noFill/>
             </a:ln>
@@ -7198,7 +7109,7 @@
           <a:buFontTx/>
           <a:buNone/>
           <a:tabLst/>
-          <a:defRPr kumimoji="0" sz="1800" b="0" i="0" u="none" strike="noStrike" cap="none" spc="0" normalizeH="0" baseline="0">
+          <a:defRPr b="0" baseline="0" cap="none" i="0" spc="0" strike="noStrike" sz="1800" u="none" kumimoji="0" normalizeH="0">
             <a:ln>
               <a:noFill/>
             </a:ln>
@@ -7224,7 +7135,7 @@
           <a:buFontTx/>
           <a:buNone/>
           <a:tabLst/>
-          <a:defRPr kumimoji="0" sz="1800" b="0" i="0" u="none" strike="noStrike" cap="none" spc="0" normalizeH="0" baseline="0">
+          <a:defRPr b="0" baseline="0" cap="none" i="0" spc="0" strike="noStrike" sz="1800" u="none" kumimoji="0" normalizeH="0">
             <a:ln>
               <a:noFill/>
             </a:ln>
@@ -7250,7 +7161,7 @@
           <a:buFontTx/>
           <a:buNone/>
           <a:tabLst/>
-          <a:defRPr kumimoji="0" sz="1800" b="0" i="0" u="none" strike="noStrike" cap="none" spc="0" normalizeH="0" baseline="0">
+          <a:defRPr b="0" baseline="0" cap="none" i="0" spc="0" strike="noStrike" sz="1800" u="none" kumimoji="0" normalizeH="0">
             <a:ln>
               <a:noFill/>
             </a:ln>
@@ -7276,7 +7187,7 @@
           <a:buFontTx/>
           <a:buNone/>
           <a:tabLst/>
-          <a:defRPr kumimoji="0" sz="1800" b="0" i="0" u="none" strike="noStrike" cap="none" spc="0" normalizeH="0" baseline="0">
+          <a:defRPr b="0" baseline="0" cap="none" i="0" spc="0" strike="noStrike" sz="1800" u="none" kumimoji="0" normalizeH="0">
             <a:ln>
               <a:noFill/>
             </a:ln>
@@ -7302,7 +7213,7 @@
           <a:buFontTx/>
           <a:buNone/>
           <a:tabLst/>
-          <a:defRPr kumimoji="0" sz="1800" b="0" i="0" u="none" strike="noStrike" cap="none" spc="0" normalizeH="0" baseline="0">
+          <a:defRPr b="0" baseline="0" cap="none" i="0" spc="0" strike="noStrike" sz="1800" u="none" kumimoji="0" normalizeH="0">
             <a:ln>
               <a:noFill/>
             </a:ln>
@@ -7328,7 +7239,7 @@
           <a:buFontTx/>
           <a:buNone/>
           <a:tabLst/>
-          <a:defRPr kumimoji="0" sz="1800" b="0" i="0" u="none" strike="noStrike" cap="none" spc="0" normalizeH="0" baseline="0">
+          <a:defRPr b="0" baseline="0" cap="none" i="0" spc="0" strike="noStrike" sz="1800" u="none" kumimoji="0" normalizeH="0">
             <a:ln>
               <a:noFill/>
             </a:ln>
@@ -7354,7 +7265,7 @@
           <a:buFontTx/>
           <a:buNone/>
           <a:tabLst/>
-          <a:defRPr kumimoji="0" sz="1800" b="0" i="0" u="none" strike="noStrike" cap="none" spc="0" normalizeH="0" baseline="0">
+          <a:defRPr b="0" baseline="0" cap="none" i="0" spc="0" strike="noStrike" sz="1800" u="none" kumimoji="0" normalizeH="0">
             <a:ln>
               <a:noFill/>
             </a:ln>
@@ -7367,19 +7278,12 @@
         </a:lvl9pPr>
       </a:lstStyle>
       <a:style>
-        <a:lnRef idx="0">
-          <a:scrgbClr r="0" g="0" b="0"/>
-        </a:lnRef>
-        <a:fillRef idx="0">
-          <a:scrgbClr r="0" g="0" b="0"/>
-        </a:fillRef>
-        <a:effectRef idx="0">
-          <a:scrgbClr r="0" g="0" b="0"/>
-        </a:effectRef>
+        <a:lnRef idx="0"/>
+        <a:fillRef idx="0"/>
+        <a:effectRef idx="0"/>
         <a:fontRef idx="none"/>
       </a:style>
     </a:txDef>
   </a:objectDefaults>
-  <a:extraClrSchemeLst/>
 </a:theme>
 </file>
</xml_diff>